<commit_message>
Updated XML and Exceptions presentation
</commit_message>
<xml_diff>
--- a/Presentation/lesson-04-exceptions.pptx
+++ b/Presentation/lesson-04-exceptions.pptx
@@ -303,7 +303,7 @@
             <a:fld id="{FAECF776-F836-4CCD-9497-99E5597B8B5D}" type="datetimeFigureOut">
               <a:rPr lang="en-US" smtClean="0"/>
               <a:pPr/>
-              <a:t>3/29/2015</a:t>
+              <a:t>4/10/2015</a:t>
             </a:fld>
             <a:endParaRPr lang="en-US"/>
           </a:p>
@@ -475,7 +475,7 @@
             <a:fld id="{FAECF776-F836-4CCD-9497-99E5597B8B5D}" type="datetimeFigureOut">
               <a:rPr lang="en-US" smtClean="0"/>
               <a:pPr/>
-              <a:t>3/29/2015</a:t>
+              <a:t>4/10/2015</a:t>
             </a:fld>
             <a:endParaRPr lang="en-US"/>
           </a:p>
@@ -657,7 +657,7 @@
             <a:fld id="{FAECF776-F836-4CCD-9497-99E5597B8B5D}" type="datetimeFigureOut">
               <a:rPr lang="en-US" smtClean="0"/>
               <a:pPr/>
-              <a:t>3/29/2015</a:t>
+              <a:t>4/10/2015</a:t>
             </a:fld>
             <a:endParaRPr lang="en-US"/>
           </a:p>
@@ -829,7 +829,7 @@
             <a:fld id="{FAECF776-F836-4CCD-9497-99E5597B8B5D}" type="datetimeFigureOut">
               <a:rPr lang="en-US" smtClean="0"/>
               <a:pPr/>
-              <a:t>3/29/2015</a:t>
+              <a:t>4/10/2015</a:t>
             </a:fld>
             <a:endParaRPr lang="en-US"/>
           </a:p>
@@ -1077,7 +1077,7 @@
             <a:fld id="{FAECF776-F836-4CCD-9497-99E5597B8B5D}" type="datetimeFigureOut">
               <a:rPr lang="en-US" smtClean="0"/>
               <a:pPr/>
-              <a:t>3/29/2015</a:t>
+              <a:t>4/10/2015</a:t>
             </a:fld>
             <a:endParaRPr lang="en-US"/>
           </a:p>
@@ -1367,7 +1367,7 @@
             <a:fld id="{FAECF776-F836-4CCD-9497-99E5597B8B5D}" type="datetimeFigureOut">
               <a:rPr lang="en-US" smtClean="0"/>
               <a:pPr/>
-              <a:t>3/29/2015</a:t>
+              <a:t>4/10/2015</a:t>
             </a:fld>
             <a:endParaRPr lang="en-US"/>
           </a:p>
@@ -1791,7 +1791,7 @@
             <a:fld id="{FAECF776-F836-4CCD-9497-99E5597B8B5D}" type="datetimeFigureOut">
               <a:rPr lang="en-US" smtClean="0"/>
               <a:pPr/>
-              <a:t>3/29/2015</a:t>
+              <a:t>4/10/2015</a:t>
             </a:fld>
             <a:endParaRPr lang="en-US"/>
           </a:p>
@@ -1911,7 +1911,7 @@
             <a:fld id="{FAECF776-F836-4CCD-9497-99E5597B8B5D}" type="datetimeFigureOut">
               <a:rPr lang="en-US" smtClean="0"/>
               <a:pPr/>
-              <a:t>3/29/2015</a:t>
+              <a:t>4/10/2015</a:t>
             </a:fld>
             <a:endParaRPr lang="en-US"/>
           </a:p>
@@ -2008,7 +2008,7 @@
             <a:fld id="{FAECF776-F836-4CCD-9497-99E5597B8B5D}" type="datetimeFigureOut">
               <a:rPr lang="en-US" smtClean="0"/>
               <a:pPr/>
-              <a:t>3/29/2015</a:t>
+              <a:t>4/10/2015</a:t>
             </a:fld>
             <a:endParaRPr lang="en-US"/>
           </a:p>
@@ -2287,7 +2287,7 @@
             <a:fld id="{FAECF776-F836-4CCD-9497-99E5597B8B5D}" type="datetimeFigureOut">
               <a:rPr lang="en-US" smtClean="0"/>
               <a:pPr/>
-              <a:t>3/29/2015</a:t>
+              <a:t>4/10/2015</a:t>
             </a:fld>
             <a:endParaRPr lang="en-US"/>
           </a:p>
@@ -2542,7 +2542,7 @@
             <a:fld id="{FAECF776-F836-4CCD-9497-99E5597B8B5D}" type="datetimeFigureOut">
               <a:rPr lang="en-US" smtClean="0"/>
               <a:pPr/>
-              <a:t>3/29/2015</a:t>
+              <a:t>4/10/2015</a:t>
             </a:fld>
             <a:endParaRPr lang="en-US"/>
           </a:p>
@@ -2766,7 +2766,7 @@
             <a:fld id="{FAECF776-F836-4CCD-9497-99E5597B8B5D}" type="datetimeFigureOut">
               <a:rPr lang="en-US" smtClean="0"/>
               <a:pPr/>
-              <a:t>3/29/2015</a:t>
+              <a:t>4/10/2015</a:t>
             </a:fld>
             <a:endParaRPr lang="en-US"/>
           </a:p>
@@ -3311,7 +3311,15 @@
                   <a:schemeClr val="bg1"/>
                 </a:solidFill>
               </a:rPr>
-              <a:t>. Средства ввода/вывода</a:t>
+              <a:t>. </a:t>
+            </a:r>
+            <a:r>
+              <a:rPr lang="ru-RU" sz="2400" dirty="0" smtClean="0">
+                <a:solidFill>
+                  <a:schemeClr val="bg1"/>
+                </a:solidFill>
+              </a:rPr>
+              <a:t>Обработка ошибок с помощью исключений</a:t>
             </a:r>
             <a:endParaRPr lang="en-US" sz="2400" dirty="0">
               <a:solidFill>
@@ -10654,7 +10662,21 @@
                 <a:latin typeface="Consolas" panose="020B0609020204030204" pitchFamily="49" charset="0"/>
                 <a:cs typeface="Consolas" panose="020B0609020204030204" pitchFamily="49" charset="0"/>
               </a:rPr>
-              <a:t>new Win32Exception(Marshal.GetLastWin32Error()); </a:t>
+              <a:t>new </a:t>
+            </a:r>
+            <a:r>
+              <a:rPr lang="en-US" sz="1400">
+                <a:latin typeface="Consolas" panose="020B0609020204030204" pitchFamily="49" charset="0"/>
+                <a:cs typeface="Consolas" panose="020B0609020204030204" pitchFamily="49" charset="0"/>
+              </a:rPr>
+              <a:t>Win32Exception(Marshal.GetLastWin32Error</a:t>
+            </a:r>
+            <a:r>
+              <a:rPr lang="en-US" sz="1400" smtClean="0">
+                <a:latin typeface="Consolas" panose="020B0609020204030204" pitchFamily="49" charset="0"/>
+                <a:cs typeface="Consolas" panose="020B0609020204030204" pitchFamily="49" charset="0"/>
+              </a:rPr>
+              <a:t>());</a:t>
             </a:r>
             <a:endParaRPr lang="en-US" sz="1400" dirty="0" smtClean="0">
               <a:latin typeface="Consolas" panose="020B0609020204030204" pitchFamily="49" charset="0"/>
@@ -10689,7 +10711,21 @@
                 <a:latin typeface="Consolas" panose="020B0609020204030204" pitchFamily="49" charset="0"/>
                 <a:cs typeface="Consolas" panose="020B0609020204030204" pitchFamily="49" charset="0"/>
               </a:rPr>
-              <a:t>(Win32Exception exception) if (</a:t>
+              <a:t>(Win32Exception exception) </a:t>
+            </a:r>
+            <a:r>
+              <a:rPr lang="en-US" sz="1400" dirty="0" smtClean="0">
+                <a:latin typeface="Consolas" panose="020B0609020204030204" pitchFamily="49" charset="0"/>
+                <a:cs typeface="Consolas" panose="020B0609020204030204" pitchFamily="49" charset="0"/>
+              </a:rPr>
+              <a:t>when </a:t>
+            </a:r>
+            <a:r>
+              <a:rPr lang="en-US" sz="1400" dirty="0">
+                <a:latin typeface="Consolas" panose="020B0609020204030204" pitchFamily="49" charset="0"/>
+                <a:cs typeface="Consolas" panose="020B0609020204030204" pitchFamily="49" charset="0"/>
+              </a:rPr>
+              <a:t>(</a:t>
             </a:r>
             <a:r>
               <a:rPr lang="en-US" sz="1400" dirty="0" err="1">

</xml_diff>

<commit_message>
UnhandledException event and how to disable WER
</commit_message>
<xml_diff>
--- a/Presentation/lesson-04-exceptions.pptx
+++ b/Presentation/lesson-04-exceptions.pptx
@@ -17,9 +17,11 @@
     <p:sldId id="282" r:id="rId11"/>
     <p:sldId id="284" r:id="rId12"/>
     <p:sldId id="285" r:id="rId13"/>
-    <p:sldId id="307" r:id="rId14"/>
-    <p:sldId id="320" r:id="rId15"/>
-    <p:sldId id="321" r:id="rId16"/>
+    <p:sldId id="322" r:id="rId14"/>
+    <p:sldId id="307" r:id="rId15"/>
+    <p:sldId id="323" r:id="rId16"/>
+    <p:sldId id="320" r:id="rId17"/>
+    <p:sldId id="321" r:id="rId18"/>
   </p:sldIdLst>
   <p:sldSz cx="9144000" cy="6858000" type="screen4x3"/>
   <p:notesSz cx="6858000" cy="9144000"/>
@@ -303,7 +305,7 @@
             <a:fld id="{FAECF776-F836-4CCD-9497-99E5597B8B5D}" type="datetimeFigureOut">
               <a:rPr lang="en-US" smtClean="0"/>
               <a:pPr/>
-              <a:t>4/10/2015</a:t>
+              <a:t>9/16/2015</a:t>
             </a:fld>
             <a:endParaRPr lang="en-US"/>
           </a:p>
@@ -475,7 +477,7 @@
             <a:fld id="{FAECF776-F836-4CCD-9497-99E5597B8B5D}" type="datetimeFigureOut">
               <a:rPr lang="en-US" smtClean="0"/>
               <a:pPr/>
-              <a:t>4/10/2015</a:t>
+              <a:t>9/16/2015</a:t>
             </a:fld>
             <a:endParaRPr lang="en-US"/>
           </a:p>
@@ -657,7 +659,7 @@
             <a:fld id="{FAECF776-F836-4CCD-9497-99E5597B8B5D}" type="datetimeFigureOut">
               <a:rPr lang="en-US" smtClean="0"/>
               <a:pPr/>
-              <a:t>4/10/2015</a:t>
+              <a:t>9/16/2015</a:t>
             </a:fld>
             <a:endParaRPr lang="en-US"/>
           </a:p>
@@ -829,7 +831,7 @@
             <a:fld id="{FAECF776-F836-4CCD-9497-99E5597B8B5D}" type="datetimeFigureOut">
               <a:rPr lang="en-US" smtClean="0"/>
               <a:pPr/>
-              <a:t>4/10/2015</a:t>
+              <a:t>9/16/2015</a:t>
             </a:fld>
             <a:endParaRPr lang="en-US"/>
           </a:p>
@@ -1077,7 +1079,7 @@
             <a:fld id="{FAECF776-F836-4CCD-9497-99E5597B8B5D}" type="datetimeFigureOut">
               <a:rPr lang="en-US" smtClean="0"/>
               <a:pPr/>
-              <a:t>4/10/2015</a:t>
+              <a:t>9/16/2015</a:t>
             </a:fld>
             <a:endParaRPr lang="en-US"/>
           </a:p>
@@ -1367,7 +1369,7 @@
             <a:fld id="{FAECF776-F836-4CCD-9497-99E5597B8B5D}" type="datetimeFigureOut">
               <a:rPr lang="en-US" smtClean="0"/>
               <a:pPr/>
-              <a:t>4/10/2015</a:t>
+              <a:t>9/16/2015</a:t>
             </a:fld>
             <a:endParaRPr lang="en-US"/>
           </a:p>
@@ -1791,7 +1793,7 @@
             <a:fld id="{FAECF776-F836-4CCD-9497-99E5597B8B5D}" type="datetimeFigureOut">
               <a:rPr lang="en-US" smtClean="0"/>
               <a:pPr/>
-              <a:t>4/10/2015</a:t>
+              <a:t>9/16/2015</a:t>
             </a:fld>
             <a:endParaRPr lang="en-US"/>
           </a:p>
@@ -1911,7 +1913,7 @@
             <a:fld id="{FAECF776-F836-4CCD-9497-99E5597B8B5D}" type="datetimeFigureOut">
               <a:rPr lang="en-US" smtClean="0"/>
               <a:pPr/>
-              <a:t>4/10/2015</a:t>
+              <a:t>9/16/2015</a:t>
             </a:fld>
             <a:endParaRPr lang="en-US"/>
           </a:p>
@@ -2008,7 +2010,7 @@
             <a:fld id="{FAECF776-F836-4CCD-9497-99E5597B8B5D}" type="datetimeFigureOut">
               <a:rPr lang="en-US" smtClean="0"/>
               <a:pPr/>
-              <a:t>4/10/2015</a:t>
+              <a:t>9/16/2015</a:t>
             </a:fld>
             <a:endParaRPr lang="en-US"/>
           </a:p>
@@ -2287,7 +2289,7 @@
             <a:fld id="{FAECF776-F836-4CCD-9497-99E5597B8B5D}" type="datetimeFigureOut">
               <a:rPr lang="en-US" smtClean="0"/>
               <a:pPr/>
-              <a:t>4/10/2015</a:t>
+              <a:t>9/16/2015</a:t>
             </a:fld>
             <a:endParaRPr lang="en-US"/>
           </a:p>
@@ -2542,7 +2544,7 @@
             <a:fld id="{FAECF776-F836-4CCD-9497-99E5597B8B5D}" type="datetimeFigureOut">
               <a:rPr lang="en-US" smtClean="0"/>
               <a:pPr/>
-              <a:t>4/10/2015</a:t>
+              <a:t>9/16/2015</a:t>
             </a:fld>
             <a:endParaRPr lang="en-US"/>
           </a:p>
@@ -2766,7 +2768,7 @@
             <a:fld id="{FAECF776-F836-4CCD-9497-99E5597B8B5D}" type="datetimeFigureOut">
               <a:rPr lang="en-US" smtClean="0"/>
               <a:pPr/>
-              <a:t>4/10/2015</a:t>
+              <a:t>9/16/2015</a:t>
             </a:fld>
             <a:endParaRPr lang="en-US"/>
           </a:p>
@@ -3311,15 +3313,7 @@
                   <a:schemeClr val="bg1"/>
                 </a:solidFill>
               </a:rPr>
-              <a:t>. </a:t>
-            </a:r>
-            <a:r>
-              <a:rPr lang="ru-RU" sz="2400" dirty="0" smtClean="0">
-                <a:solidFill>
-                  <a:schemeClr val="bg1"/>
-                </a:solidFill>
-              </a:rPr>
-              <a:t>Обработка ошибок с помощью исключений</a:t>
+              <a:t>. Обработка ошибок с помощью исключений</a:t>
             </a:r>
             <a:endParaRPr lang="en-US" sz="2400" dirty="0">
               <a:solidFill>
@@ -7840,19 +7834,15 @@
         <p:spPr/>
         <p:txBody>
           <a:bodyPr>
-            <a:normAutofit/>
+            <a:noAutofit/>
           </a:bodyPr>
           <a:lstStyle/>
           <a:p>
             <a:r>
-              <a:rPr lang="ru-RU" dirty="0" smtClean="0"/>
-              <a:t>Окно </a:t>
-            </a:r>
-            <a:r>
-              <a:rPr lang="en-US" dirty="0" smtClean="0"/>
-              <a:t>Debug -&gt; Exceptions ...</a:t>
-            </a:r>
-            <a:endParaRPr lang="en-US" dirty="0"/>
+              <a:rPr lang="ru-RU" sz="3600" dirty="0" smtClean="0"/>
+              <a:t>Необработанные исключения приложения</a:t>
+            </a:r>
+            <a:endParaRPr lang="en-US" sz="3600" dirty="0"/>
           </a:p>
         </p:txBody>
       </p:sp>
@@ -7869,7 +7859,7 @@
         <p:spPr>
           <a:xfrm>
             <a:off x="457200" y="1412776"/>
-            <a:ext cx="8229600" cy="4525963"/>
+            <a:ext cx="8229600" cy="1656183"/>
           </a:xfrm>
         </p:spPr>
         <p:txBody>
@@ -7882,121 +7872,740 @@
               <a:buNone/>
             </a:pPr>
             <a:r>
-              <a:rPr lang="ru-RU" sz="1800" dirty="0" smtClean="0"/>
-              <a:t>Окно «</a:t>
-            </a:r>
-            <a:r>
-              <a:rPr lang="en-US" sz="1800" dirty="0" smtClean="0"/>
-              <a:t>Debug </a:t>
-            </a:r>
-            <a:r>
-              <a:rPr lang="en-US" sz="1800" dirty="0"/>
-              <a:t>-&gt; Exceptions </a:t>
-            </a:r>
-            <a:r>
-              <a:rPr lang="en-US" sz="1800" dirty="0" smtClean="0"/>
-              <a:t>...</a:t>
-            </a:r>
-            <a:r>
-              <a:rPr lang="ru-RU" sz="1800" dirty="0" smtClean="0"/>
-              <a:t>» контролирует поведение отладчика при генерации исключений. По умолчанию остановка будет происходить только если исключение не было обработано. Иногда возникает необходимость делать остановку как только исключения было сгенерировано. Для этого нужно поставить отметку в колонке «</a:t>
-            </a:r>
-            <a:r>
-              <a:rPr lang="en-US" sz="1800" dirty="0" smtClean="0"/>
-              <a:t>Thrown</a:t>
-            </a:r>
-            <a:r>
-              <a:rPr lang="ru-RU" sz="1800" dirty="0" smtClean="0"/>
-              <a:t>» в ветке «</a:t>
-            </a:r>
-            <a:r>
-              <a:rPr lang="en-US" sz="1800" dirty="0" smtClean="0"/>
-              <a:t>Common Language Runtime Exceptions</a:t>
-            </a:r>
-            <a:r>
-              <a:rPr lang="ru-RU" sz="1800" dirty="0" smtClean="0"/>
-              <a:t>»</a:t>
-            </a:r>
-            <a:r>
-              <a:rPr lang="en-US" sz="1800" dirty="0"/>
+              <a:rPr lang="ru-RU" sz="2000" dirty="0" smtClean="0"/>
+              <a:t>У класса </a:t>
+            </a:r>
+            <a:r>
+              <a:rPr lang="en-US" sz="2000" dirty="0" err="1" smtClean="0"/>
+              <a:t>System.AppDomain</a:t>
+            </a:r>
+            <a:r>
+              <a:rPr lang="en-US" sz="2000" dirty="0" smtClean="0"/>
               <a:t> </a:t>
             </a:r>
             <a:r>
-              <a:rPr lang="ru-RU" sz="1800" dirty="0" smtClean="0"/>
-              <a:t>для всех исключений или только для отдельных.</a:t>
-            </a:r>
-            <a:endParaRPr lang="en-US" sz="1800" dirty="0"/>
+              <a:rPr lang="ru-RU" sz="2000" dirty="0" smtClean="0"/>
+              <a:t>есть событие </a:t>
+            </a:r>
+            <a:r>
+              <a:rPr lang="en-US" sz="2000" dirty="0" err="1"/>
+              <a:t>UnhandledException</a:t>
+            </a:r>
+            <a:r>
+              <a:rPr lang="en-US" sz="2000" dirty="0"/>
+              <a:t> </a:t>
+            </a:r>
+            <a:r>
+              <a:rPr lang="ru-RU" sz="2000" dirty="0" smtClean="0"/>
+              <a:t>которое генерируется </a:t>
+            </a:r>
+            <a:r>
+              <a:rPr lang="ru-RU" sz="2000" dirty="0"/>
+              <a:t>при наличии необработанного исключения в приложении (точнее в домене приложения</a:t>
+            </a:r>
+            <a:r>
+              <a:rPr lang="ru-RU" sz="2000" dirty="0" smtClean="0"/>
+              <a:t>).</a:t>
+            </a:r>
+            <a:r>
+              <a:rPr lang="ru-RU" sz="2000" dirty="0" smtClean="0"/>
+              <a:t> Подписываться </a:t>
+            </a:r>
+            <a:r>
+              <a:rPr lang="ru-RU" sz="2000" dirty="0" smtClean="0"/>
+              <a:t>на это событие </a:t>
+            </a:r>
+            <a:r>
+              <a:rPr lang="ru-RU" sz="2000" dirty="0" smtClean="0"/>
+              <a:t>следует</a:t>
+            </a:r>
+            <a:r>
+              <a:rPr lang="en-US" sz="2000" dirty="0"/>
+              <a:t> </a:t>
+            </a:r>
+            <a:r>
+              <a:rPr lang="ru-RU" sz="2000" dirty="0" smtClean="0"/>
+              <a:t>при запуске программы. Это событие НЕ ДАЕТ возможность обработать исключение, но ДАЕТ возможность записать информацию о нем.</a:t>
+            </a:r>
+            <a:endParaRPr lang="en-US" sz="2000" dirty="0"/>
           </a:p>
         </p:txBody>
       </p:sp>
-      <p:pic>
-        <p:nvPicPr>
-          <p:cNvPr id="1028" name="Picture 4"/>
-          <p:cNvPicPr>
-            <a:picLocks noChangeAspect="1" noChangeArrowheads="1"/>
-          </p:cNvPicPr>
+      <p:sp>
+        <p:nvSpPr>
+          <p:cNvPr id="5" name="TextBox 4"/>
+          <p:cNvSpPr txBox="1"/>
           <p:nvPr/>
-        </p:nvPicPr>
-        <p:blipFill>
-          <a:blip r:embed="rId2">
-            <a:extLst>
-              <a:ext uri="{28A0092B-C50C-407E-A947-70E740481C1C}">
-                <a14:useLocalDpi xmlns:a14="http://schemas.microsoft.com/office/drawing/2010/main" val="0"/>
-              </a:ext>
-            </a:extLst>
-          </a:blip>
-          <a:srcRect/>
-          <a:stretch>
-            <a:fillRect/>
-          </a:stretch>
-        </p:blipFill>
-        <p:spPr bwMode="auto">
+        </p:nvSpPr>
+        <p:spPr>
           <a:xfrm>
-            <a:off x="899592" y="3356992"/>
-            <a:ext cx="7002463" cy="3105150"/>
+            <a:off x="467544" y="3645024"/>
+            <a:ext cx="8136904" cy="2308324"/>
           </a:xfrm>
           <a:prstGeom prst="rect">
             <a:avLst/>
           </a:prstGeom>
-          <a:noFill/>
-          <a:ln>
-            <a:noFill/>
-          </a:ln>
-          <a:effectLst/>
-          <a:extLst>
-            <a:ext uri="{909E8E84-426E-40DD-AFC4-6F175D3DCCD1}">
-              <a14:hiddenFill xmlns:a14="http://schemas.microsoft.com/office/drawing/2010/main">
-                <a:solidFill>
-                  <a:schemeClr val="accent1"/>
-                </a:solidFill>
-              </a14:hiddenFill>
-            </a:ext>
-            <a:ext uri="{91240B29-F687-4F45-9708-019B960494DF}">
-              <a14:hiddenLine xmlns:a14="http://schemas.microsoft.com/office/drawing/2010/main" w="9525">
-                <a:solidFill>
-                  <a:schemeClr val="tx1"/>
-                </a:solidFill>
-                <a:miter lim="800000"/>
-                <a:headEnd/>
-                <a:tailEnd/>
-              </a14:hiddenLine>
-            </a:ext>
-            <a:ext uri="{AF507438-7753-43E0-B8FC-AC1667EBCBE1}">
-              <a14:hiddenEffects xmlns:a14="http://schemas.microsoft.com/office/drawing/2010/main">
-                <a:effectLst>
-                  <a:outerShdw dist="35921" dir="2700000" algn="ctr" rotWithShape="0">
-                    <a:schemeClr val="bg2"/>
-                  </a:outerShdw>
-                </a:effectLst>
-              </a14:hiddenEffects>
-            </a:ext>
-          </a:extLst>
+          <a:solidFill>
+            <a:schemeClr val="bg1"/>
+          </a:solidFill>
         </p:spPr>
-      </p:pic>
+        <p:txBody>
+          <a:bodyPr wrap="square" rtlCol="0">
+            <a:spAutoFit/>
+          </a:bodyPr>
+          <a:lstStyle/>
+          <a:p>
+            <a:r>
+              <a:rPr lang="en-US" sz="1200" dirty="0">
+                <a:solidFill>
+                  <a:srgbClr val="0000FF"/>
+                </a:solidFill>
+                <a:latin typeface="Courier New" panose="02070309020205020404" pitchFamily="49" charset="0"/>
+                <a:cs typeface="Courier New" panose="02070309020205020404" pitchFamily="49" charset="0"/>
+              </a:rPr>
+              <a:t>static</a:t>
+            </a:r>
+            <a:r>
+              <a:rPr lang="en-US" sz="1200" dirty="0">
+                <a:latin typeface="Courier New" panose="02070309020205020404" pitchFamily="49" charset="0"/>
+                <a:cs typeface="Courier New" panose="02070309020205020404" pitchFamily="49" charset="0"/>
+              </a:rPr>
+              <a:t> </a:t>
+            </a:r>
+            <a:r>
+              <a:rPr lang="en-US" sz="1200" dirty="0">
+                <a:solidFill>
+                  <a:srgbClr val="0000FF"/>
+                </a:solidFill>
+                <a:latin typeface="Courier New" panose="02070309020205020404" pitchFamily="49" charset="0"/>
+                <a:cs typeface="Courier New" panose="02070309020205020404" pitchFamily="49" charset="0"/>
+              </a:rPr>
+              <a:t>void</a:t>
+            </a:r>
+            <a:r>
+              <a:rPr lang="en-US" sz="1200" dirty="0">
+                <a:solidFill>
+                  <a:srgbClr val="000000"/>
+                </a:solidFill>
+                <a:latin typeface="Courier New" panose="02070309020205020404" pitchFamily="49" charset="0"/>
+                <a:cs typeface="Courier New" panose="02070309020205020404" pitchFamily="49" charset="0"/>
+              </a:rPr>
+              <a:t> Main(</a:t>
+            </a:r>
+            <a:r>
+              <a:rPr lang="en-US" sz="1200" dirty="0">
+                <a:solidFill>
+                  <a:srgbClr val="0000FF"/>
+                </a:solidFill>
+                <a:latin typeface="Courier New" panose="02070309020205020404" pitchFamily="49" charset="0"/>
+                <a:cs typeface="Courier New" panose="02070309020205020404" pitchFamily="49" charset="0"/>
+              </a:rPr>
+              <a:t>string</a:t>
+            </a:r>
+            <a:r>
+              <a:rPr lang="en-US" sz="1200" dirty="0">
+                <a:solidFill>
+                  <a:srgbClr val="000000"/>
+                </a:solidFill>
+                <a:latin typeface="Courier New" panose="02070309020205020404" pitchFamily="49" charset="0"/>
+                <a:cs typeface="Courier New" panose="02070309020205020404" pitchFamily="49" charset="0"/>
+              </a:rPr>
+              <a:t>[] args</a:t>
+            </a:r>
+            <a:r>
+              <a:rPr lang="en-US" sz="1200" dirty="0" smtClean="0">
+                <a:solidFill>
+                  <a:srgbClr val="000000"/>
+                </a:solidFill>
+                <a:latin typeface="Courier New" panose="02070309020205020404" pitchFamily="49" charset="0"/>
+                <a:cs typeface="Courier New" panose="02070309020205020404" pitchFamily="49" charset="0"/>
+              </a:rPr>
+              <a:t>)</a:t>
+            </a:r>
+            <a:endParaRPr lang="ru-RU" sz="1200" dirty="0" smtClean="0">
+              <a:solidFill>
+                <a:srgbClr val="000000"/>
+              </a:solidFill>
+              <a:latin typeface="Courier New" panose="02070309020205020404" pitchFamily="49" charset="0"/>
+              <a:cs typeface="Courier New" panose="02070309020205020404" pitchFamily="49" charset="0"/>
+            </a:endParaRPr>
+          </a:p>
+          <a:p>
+            <a:r>
+              <a:rPr lang="en-US" sz="1200" dirty="0" smtClean="0">
+                <a:solidFill>
+                  <a:srgbClr val="000000"/>
+                </a:solidFill>
+                <a:latin typeface="Courier New" panose="02070309020205020404" pitchFamily="49" charset="0"/>
+                <a:cs typeface="Courier New" panose="02070309020205020404" pitchFamily="49" charset="0"/>
+              </a:rPr>
+              <a:t>{</a:t>
+            </a:r>
+            <a:endParaRPr lang="ru-RU" sz="1200" dirty="0" smtClean="0">
+              <a:solidFill>
+                <a:srgbClr val="000000"/>
+              </a:solidFill>
+              <a:latin typeface="Courier New" panose="02070309020205020404" pitchFamily="49" charset="0"/>
+              <a:cs typeface="Courier New" panose="02070309020205020404" pitchFamily="49" charset="0"/>
+            </a:endParaRPr>
+          </a:p>
+          <a:p>
+            <a:r>
+              <a:rPr lang="ru-RU" sz="1200" dirty="0" smtClean="0">
+                <a:solidFill>
+                  <a:srgbClr val="2B91AF"/>
+                </a:solidFill>
+                <a:latin typeface="Courier New" panose="02070309020205020404" pitchFamily="49" charset="0"/>
+                <a:cs typeface="Courier New" panose="02070309020205020404" pitchFamily="49" charset="0"/>
+              </a:rPr>
+              <a:t>    </a:t>
+            </a:r>
+            <a:r>
+              <a:rPr lang="en-US" sz="1200" dirty="0" smtClean="0">
+                <a:solidFill>
+                  <a:srgbClr val="2B91AF"/>
+                </a:solidFill>
+                <a:latin typeface="Courier New" panose="02070309020205020404" pitchFamily="49" charset="0"/>
+                <a:cs typeface="Courier New" panose="02070309020205020404" pitchFamily="49" charset="0"/>
+              </a:rPr>
+              <a:t>AppDomain</a:t>
+            </a:r>
+            <a:r>
+              <a:rPr lang="en-US" sz="1200" dirty="0" smtClean="0">
+                <a:solidFill>
+                  <a:srgbClr val="000000"/>
+                </a:solidFill>
+                <a:latin typeface="Courier New" panose="02070309020205020404" pitchFamily="49" charset="0"/>
+                <a:cs typeface="Courier New" panose="02070309020205020404" pitchFamily="49" charset="0"/>
+              </a:rPr>
+              <a:t>.CurrentDomain.UnhandledException</a:t>
+            </a:r>
+            <a:r>
+              <a:rPr lang="en-US" sz="1200" dirty="0">
+                <a:solidFill>
+                  <a:srgbClr val="000000"/>
+                </a:solidFill>
+                <a:latin typeface="Courier New" panose="02070309020205020404" pitchFamily="49" charset="0"/>
+                <a:cs typeface="Courier New" panose="02070309020205020404" pitchFamily="49" charset="0"/>
+              </a:rPr>
+              <a:t> += OnUnhandledException</a:t>
+            </a:r>
+            <a:r>
+              <a:rPr lang="en-US" sz="1200" dirty="0" smtClean="0">
+                <a:solidFill>
+                  <a:srgbClr val="000000"/>
+                </a:solidFill>
+                <a:latin typeface="Courier New" panose="02070309020205020404" pitchFamily="49" charset="0"/>
+                <a:cs typeface="Courier New" panose="02070309020205020404" pitchFamily="49" charset="0"/>
+              </a:rPr>
+              <a:t>;</a:t>
+            </a:r>
+            <a:endParaRPr lang="ru-RU" sz="1200" dirty="0" smtClean="0">
+              <a:solidFill>
+                <a:srgbClr val="000000"/>
+              </a:solidFill>
+              <a:latin typeface="Courier New" panose="02070309020205020404" pitchFamily="49" charset="0"/>
+              <a:cs typeface="Courier New" panose="02070309020205020404" pitchFamily="49" charset="0"/>
+            </a:endParaRPr>
+          </a:p>
+          <a:p>
+            <a:r>
+              <a:rPr lang="ru-RU" sz="1200" dirty="0" smtClean="0">
+                <a:solidFill>
+                  <a:srgbClr val="008000"/>
+                </a:solidFill>
+                <a:latin typeface="Courier New" panose="02070309020205020404" pitchFamily="49" charset="0"/>
+                <a:cs typeface="Courier New" panose="02070309020205020404" pitchFamily="49" charset="0"/>
+              </a:rPr>
+              <a:t>   </a:t>
+            </a:r>
+            <a:r>
+              <a:rPr lang="en-US" sz="1200" dirty="0" smtClean="0">
+                <a:solidFill>
+                  <a:srgbClr val="008000"/>
+                </a:solidFill>
+                <a:latin typeface="Courier New" panose="02070309020205020404" pitchFamily="49" charset="0"/>
+                <a:cs typeface="Courier New" panose="02070309020205020404" pitchFamily="49" charset="0"/>
+              </a:rPr>
+              <a:t> //</a:t>
+            </a:r>
+            <a:r>
+              <a:rPr lang="en-US" sz="1200" dirty="0">
+                <a:solidFill>
+                  <a:srgbClr val="008000"/>
+                </a:solidFill>
+                <a:latin typeface="Courier New" panose="02070309020205020404" pitchFamily="49" charset="0"/>
+                <a:cs typeface="Courier New" panose="02070309020205020404" pitchFamily="49" charset="0"/>
+              </a:rPr>
+              <a:t> </a:t>
+            </a:r>
+            <a:r>
+              <a:rPr lang="ru-RU" sz="1200" dirty="0" smtClean="0">
+                <a:solidFill>
+                  <a:srgbClr val="008000"/>
+                </a:solidFill>
+                <a:latin typeface="Courier New" panose="02070309020205020404" pitchFamily="49" charset="0"/>
+                <a:cs typeface="Courier New" panose="02070309020205020404" pitchFamily="49" charset="0"/>
+              </a:rPr>
+              <a:t>Основной код приложения</a:t>
+            </a:r>
+            <a:endParaRPr lang="ru-RU" sz="1200" dirty="0" smtClean="0">
+              <a:solidFill>
+                <a:srgbClr val="000000"/>
+              </a:solidFill>
+              <a:latin typeface="Courier New" panose="02070309020205020404" pitchFamily="49" charset="0"/>
+              <a:cs typeface="Courier New" panose="02070309020205020404" pitchFamily="49" charset="0"/>
+            </a:endParaRPr>
+          </a:p>
+          <a:p>
+            <a:r>
+              <a:rPr lang="en-US" sz="1200" dirty="0" smtClean="0">
+                <a:solidFill>
+                  <a:srgbClr val="000000"/>
+                </a:solidFill>
+                <a:latin typeface="Courier New" panose="02070309020205020404" pitchFamily="49" charset="0"/>
+                <a:cs typeface="Courier New" panose="02070309020205020404" pitchFamily="49" charset="0"/>
+              </a:rPr>
+              <a:t>}</a:t>
+            </a:r>
+            <a:endParaRPr lang="ru-RU" sz="1200" dirty="0" smtClean="0">
+              <a:solidFill>
+                <a:srgbClr val="000000"/>
+              </a:solidFill>
+              <a:latin typeface="Courier New" panose="02070309020205020404" pitchFamily="49" charset="0"/>
+              <a:cs typeface="Courier New" panose="02070309020205020404" pitchFamily="49" charset="0"/>
+            </a:endParaRPr>
+          </a:p>
+          <a:p>
+            <a:endParaRPr lang="ru-RU" sz="1200" dirty="0">
+              <a:solidFill>
+                <a:srgbClr val="000000"/>
+              </a:solidFill>
+              <a:latin typeface="Courier New" panose="02070309020205020404" pitchFamily="49" charset="0"/>
+              <a:cs typeface="Courier New" panose="02070309020205020404" pitchFamily="49" charset="0"/>
+            </a:endParaRPr>
+          </a:p>
+          <a:p>
+            <a:r>
+              <a:rPr lang="en-US" sz="1200" dirty="0" smtClean="0">
+                <a:solidFill>
+                  <a:srgbClr val="0000FF"/>
+                </a:solidFill>
+                <a:latin typeface="Courier New" panose="02070309020205020404" pitchFamily="49" charset="0"/>
+                <a:cs typeface="Courier New" panose="02070309020205020404" pitchFamily="49" charset="0"/>
+              </a:rPr>
+              <a:t>private</a:t>
+            </a:r>
+            <a:r>
+              <a:rPr lang="en-US" sz="1200" dirty="0">
+                <a:latin typeface="Courier New" panose="02070309020205020404" pitchFamily="49" charset="0"/>
+                <a:cs typeface="Courier New" panose="02070309020205020404" pitchFamily="49" charset="0"/>
+              </a:rPr>
+              <a:t> </a:t>
+            </a:r>
+            <a:r>
+              <a:rPr lang="en-US" sz="1200" dirty="0">
+                <a:solidFill>
+                  <a:srgbClr val="0000FF"/>
+                </a:solidFill>
+                <a:latin typeface="Courier New" panose="02070309020205020404" pitchFamily="49" charset="0"/>
+                <a:cs typeface="Courier New" panose="02070309020205020404" pitchFamily="49" charset="0"/>
+              </a:rPr>
+              <a:t>static</a:t>
+            </a:r>
+            <a:r>
+              <a:rPr lang="en-US" sz="1200" dirty="0">
+                <a:latin typeface="Courier New" panose="02070309020205020404" pitchFamily="49" charset="0"/>
+                <a:cs typeface="Courier New" panose="02070309020205020404" pitchFamily="49" charset="0"/>
+              </a:rPr>
+              <a:t> </a:t>
+            </a:r>
+            <a:r>
+              <a:rPr lang="en-US" sz="1200" dirty="0">
+                <a:solidFill>
+                  <a:srgbClr val="0000FF"/>
+                </a:solidFill>
+                <a:latin typeface="Courier New" panose="02070309020205020404" pitchFamily="49" charset="0"/>
+                <a:cs typeface="Courier New" panose="02070309020205020404" pitchFamily="49" charset="0"/>
+              </a:rPr>
+              <a:t>void</a:t>
+            </a:r>
+            <a:r>
+              <a:rPr lang="en-US" sz="1200" dirty="0">
+                <a:solidFill>
+                  <a:srgbClr val="000000"/>
+                </a:solidFill>
+                <a:latin typeface="Courier New" panose="02070309020205020404" pitchFamily="49" charset="0"/>
+                <a:cs typeface="Courier New" panose="02070309020205020404" pitchFamily="49" charset="0"/>
+              </a:rPr>
+              <a:t> OnUnhandledException(</a:t>
+            </a:r>
+            <a:r>
+              <a:rPr lang="en-US" sz="1200" dirty="0">
+                <a:solidFill>
+                  <a:srgbClr val="0000FF"/>
+                </a:solidFill>
+                <a:latin typeface="Courier New" panose="02070309020205020404" pitchFamily="49" charset="0"/>
+                <a:cs typeface="Courier New" panose="02070309020205020404" pitchFamily="49" charset="0"/>
+              </a:rPr>
+              <a:t>object</a:t>
+            </a:r>
+            <a:r>
+              <a:rPr lang="en-US" sz="1200" dirty="0">
+                <a:solidFill>
+                  <a:srgbClr val="000000"/>
+                </a:solidFill>
+                <a:latin typeface="Courier New" panose="02070309020205020404" pitchFamily="49" charset="0"/>
+                <a:cs typeface="Courier New" panose="02070309020205020404" pitchFamily="49" charset="0"/>
+              </a:rPr>
+              <a:t> sender,</a:t>
+            </a:r>
+            <a:r>
+              <a:rPr lang="en-US" sz="1200" dirty="0">
+                <a:latin typeface="Courier New" panose="02070309020205020404" pitchFamily="49" charset="0"/>
+                <a:cs typeface="Courier New" panose="02070309020205020404" pitchFamily="49" charset="0"/>
+              </a:rPr>
+              <a:t> </a:t>
+            </a:r>
+            <a:r>
+              <a:rPr lang="en-US" sz="1200" dirty="0">
+                <a:solidFill>
+                  <a:srgbClr val="2B91AF"/>
+                </a:solidFill>
+                <a:latin typeface="Courier New" panose="02070309020205020404" pitchFamily="49" charset="0"/>
+                <a:cs typeface="Courier New" panose="02070309020205020404" pitchFamily="49" charset="0"/>
+              </a:rPr>
+              <a:t>UnhandledExceptionEventArgs</a:t>
+            </a:r>
+            <a:r>
+              <a:rPr lang="en-US" sz="1200" dirty="0">
+                <a:solidFill>
+                  <a:srgbClr val="000000"/>
+                </a:solidFill>
+                <a:latin typeface="Courier New" panose="02070309020205020404" pitchFamily="49" charset="0"/>
+                <a:cs typeface="Courier New" panose="02070309020205020404" pitchFamily="49" charset="0"/>
+              </a:rPr>
+              <a:t> e</a:t>
+            </a:r>
+            <a:r>
+              <a:rPr lang="en-US" sz="1200" dirty="0" smtClean="0">
+                <a:solidFill>
+                  <a:srgbClr val="000000"/>
+                </a:solidFill>
+                <a:latin typeface="Courier New" panose="02070309020205020404" pitchFamily="49" charset="0"/>
+                <a:cs typeface="Courier New" panose="02070309020205020404" pitchFamily="49" charset="0"/>
+              </a:rPr>
+              <a:t>)</a:t>
+            </a:r>
+            <a:endParaRPr lang="ru-RU" sz="1200" dirty="0" smtClean="0">
+              <a:solidFill>
+                <a:srgbClr val="000000"/>
+              </a:solidFill>
+              <a:latin typeface="Courier New" panose="02070309020205020404" pitchFamily="49" charset="0"/>
+              <a:cs typeface="Courier New" panose="02070309020205020404" pitchFamily="49" charset="0"/>
+            </a:endParaRPr>
+          </a:p>
+          <a:p>
+            <a:r>
+              <a:rPr lang="en-US" sz="1200" dirty="0" smtClean="0">
+                <a:solidFill>
+                  <a:srgbClr val="000000"/>
+                </a:solidFill>
+                <a:latin typeface="Courier New" panose="02070309020205020404" pitchFamily="49" charset="0"/>
+                <a:cs typeface="Courier New" panose="02070309020205020404" pitchFamily="49" charset="0"/>
+              </a:rPr>
+              <a:t>{</a:t>
+            </a:r>
+            <a:endParaRPr lang="ru-RU" sz="1200" dirty="0" smtClean="0">
+              <a:solidFill>
+                <a:srgbClr val="000000"/>
+              </a:solidFill>
+              <a:latin typeface="Courier New" panose="02070309020205020404" pitchFamily="49" charset="0"/>
+              <a:cs typeface="Courier New" panose="02070309020205020404" pitchFamily="49" charset="0"/>
+            </a:endParaRPr>
+          </a:p>
+          <a:p>
+            <a:r>
+              <a:rPr lang="ru-RU" sz="1200" dirty="0">
+                <a:solidFill>
+                  <a:srgbClr val="000000"/>
+                </a:solidFill>
+                <a:latin typeface="Courier New" panose="02070309020205020404" pitchFamily="49" charset="0"/>
+                <a:cs typeface="Courier New" panose="02070309020205020404" pitchFamily="49" charset="0"/>
+              </a:rPr>
+              <a:t> </a:t>
+            </a:r>
+            <a:r>
+              <a:rPr lang="ru-RU" sz="1200" dirty="0" smtClean="0">
+                <a:solidFill>
+                  <a:srgbClr val="000000"/>
+                </a:solidFill>
+                <a:latin typeface="Courier New" panose="02070309020205020404" pitchFamily="49" charset="0"/>
+                <a:cs typeface="Courier New" panose="02070309020205020404" pitchFamily="49" charset="0"/>
+              </a:rPr>
+              <a:t>   </a:t>
+            </a:r>
+            <a:r>
+              <a:rPr lang="en-US" sz="1200" dirty="0" smtClean="0">
+                <a:solidFill>
+                  <a:srgbClr val="2B91AF"/>
+                </a:solidFill>
+                <a:latin typeface="Courier New" panose="02070309020205020404" pitchFamily="49" charset="0"/>
+                <a:cs typeface="Courier New" panose="02070309020205020404" pitchFamily="49" charset="0"/>
+              </a:rPr>
+              <a:t>Exception</a:t>
+            </a:r>
+            <a:r>
+              <a:rPr lang="en-US" sz="1200" dirty="0">
+                <a:solidFill>
+                  <a:srgbClr val="000000"/>
+                </a:solidFill>
+                <a:latin typeface="Courier New" panose="02070309020205020404" pitchFamily="49" charset="0"/>
+                <a:cs typeface="Courier New" panose="02070309020205020404" pitchFamily="49" charset="0"/>
+              </a:rPr>
+              <a:t> ex = e.ExceptionObject </a:t>
+            </a:r>
+            <a:r>
+              <a:rPr lang="en-US" sz="1200" dirty="0">
+                <a:solidFill>
+                  <a:srgbClr val="0000FF"/>
+                </a:solidFill>
+                <a:latin typeface="Courier New" panose="02070309020205020404" pitchFamily="49" charset="0"/>
+                <a:cs typeface="Courier New" panose="02070309020205020404" pitchFamily="49" charset="0"/>
+              </a:rPr>
+              <a:t>as</a:t>
+            </a:r>
+            <a:r>
+              <a:rPr lang="en-US" sz="1200" dirty="0">
+                <a:latin typeface="Courier New" panose="02070309020205020404" pitchFamily="49" charset="0"/>
+                <a:cs typeface="Courier New" panose="02070309020205020404" pitchFamily="49" charset="0"/>
+              </a:rPr>
+              <a:t> </a:t>
+            </a:r>
+            <a:r>
+              <a:rPr lang="en-US" sz="1200" dirty="0" smtClean="0">
+                <a:solidFill>
+                  <a:srgbClr val="2B91AF"/>
+                </a:solidFill>
+                <a:latin typeface="Courier New" panose="02070309020205020404" pitchFamily="49" charset="0"/>
+                <a:cs typeface="Courier New" panose="02070309020205020404" pitchFamily="49" charset="0"/>
+              </a:rPr>
+              <a:t>Exception</a:t>
+            </a:r>
+            <a:r>
+              <a:rPr lang="en-US" sz="1200" dirty="0" smtClean="0">
+                <a:solidFill>
+                  <a:srgbClr val="000000"/>
+                </a:solidFill>
+                <a:latin typeface="Courier New" panose="02070309020205020404" pitchFamily="49" charset="0"/>
+                <a:cs typeface="Courier New" panose="02070309020205020404" pitchFamily="49" charset="0"/>
+              </a:rPr>
+              <a:t>;</a:t>
+            </a:r>
+            <a:endParaRPr lang="ru-RU" sz="1200" dirty="0" smtClean="0">
+              <a:solidFill>
+                <a:srgbClr val="000000"/>
+              </a:solidFill>
+              <a:latin typeface="Courier New" panose="02070309020205020404" pitchFamily="49" charset="0"/>
+              <a:cs typeface="Courier New" panose="02070309020205020404" pitchFamily="49" charset="0"/>
+            </a:endParaRPr>
+          </a:p>
+          <a:p>
+            <a:r>
+              <a:rPr lang="ru-RU" sz="1200" dirty="0">
+                <a:solidFill>
+                  <a:srgbClr val="000000"/>
+                </a:solidFill>
+                <a:latin typeface="Courier New" panose="02070309020205020404" pitchFamily="49" charset="0"/>
+                <a:cs typeface="Courier New" panose="02070309020205020404" pitchFamily="49" charset="0"/>
+              </a:rPr>
+              <a:t> </a:t>
+            </a:r>
+            <a:r>
+              <a:rPr lang="ru-RU" sz="1200" dirty="0" smtClean="0">
+                <a:solidFill>
+                  <a:srgbClr val="000000"/>
+                </a:solidFill>
+                <a:latin typeface="Courier New" panose="02070309020205020404" pitchFamily="49" charset="0"/>
+                <a:cs typeface="Courier New" panose="02070309020205020404" pitchFamily="49" charset="0"/>
+              </a:rPr>
+              <a:t>   </a:t>
+            </a:r>
+            <a:r>
+              <a:rPr lang="en-US" sz="1200" dirty="0" smtClean="0">
+                <a:solidFill>
+                  <a:srgbClr val="0000FF"/>
+                </a:solidFill>
+                <a:latin typeface="Courier New" panose="02070309020205020404" pitchFamily="49" charset="0"/>
+                <a:cs typeface="Courier New" panose="02070309020205020404" pitchFamily="49" charset="0"/>
+              </a:rPr>
+              <a:t>if</a:t>
+            </a:r>
+            <a:r>
+              <a:rPr lang="en-US" sz="1200" dirty="0">
+                <a:solidFill>
+                  <a:srgbClr val="000000"/>
+                </a:solidFill>
+                <a:latin typeface="Courier New" panose="02070309020205020404" pitchFamily="49" charset="0"/>
+                <a:cs typeface="Courier New" panose="02070309020205020404" pitchFamily="49" charset="0"/>
+              </a:rPr>
+              <a:t> (ex == </a:t>
+            </a:r>
+            <a:r>
+              <a:rPr lang="en-US" sz="1200" dirty="0">
+                <a:solidFill>
+                  <a:srgbClr val="0000FF"/>
+                </a:solidFill>
+                <a:latin typeface="Courier New" panose="02070309020205020404" pitchFamily="49" charset="0"/>
+                <a:cs typeface="Courier New" panose="02070309020205020404" pitchFamily="49" charset="0"/>
+              </a:rPr>
+              <a:t>null</a:t>
+            </a:r>
+            <a:r>
+              <a:rPr lang="en-US" sz="1200" dirty="0">
+                <a:solidFill>
+                  <a:srgbClr val="000000"/>
+                </a:solidFill>
+                <a:latin typeface="Courier New" panose="02070309020205020404" pitchFamily="49" charset="0"/>
+                <a:cs typeface="Courier New" panose="02070309020205020404" pitchFamily="49" charset="0"/>
+              </a:rPr>
+              <a:t>) </a:t>
+            </a:r>
+            <a:r>
+              <a:rPr lang="en-US" sz="1200" dirty="0">
+                <a:solidFill>
+                  <a:srgbClr val="0000FF"/>
+                </a:solidFill>
+                <a:latin typeface="Courier New" panose="02070309020205020404" pitchFamily="49" charset="0"/>
+                <a:cs typeface="Courier New" panose="02070309020205020404" pitchFamily="49" charset="0"/>
+              </a:rPr>
+              <a:t>return</a:t>
+            </a:r>
+            <a:r>
+              <a:rPr lang="en-US" sz="1200" dirty="0" smtClean="0">
+                <a:solidFill>
+                  <a:srgbClr val="000000"/>
+                </a:solidFill>
+                <a:latin typeface="Courier New" panose="02070309020205020404" pitchFamily="49" charset="0"/>
+                <a:cs typeface="Courier New" panose="02070309020205020404" pitchFamily="49" charset="0"/>
+              </a:rPr>
+              <a:t>;</a:t>
+            </a:r>
+            <a:endParaRPr lang="ru-RU" sz="1200" dirty="0" smtClean="0">
+              <a:solidFill>
+                <a:srgbClr val="000000"/>
+              </a:solidFill>
+              <a:latin typeface="Courier New" panose="02070309020205020404" pitchFamily="49" charset="0"/>
+              <a:cs typeface="Courier New" panose="02070309020205020404" pitchFamily="49" charset="0"/>
+            </a:endParaRPr>
+          </a:p>
+          <a:p>
+            <a:r>
+              <a:rPr lang="ru-RU" sz="1200" dirty="0">
+                <a:solidFill>
+                  <a:srgbClr val="000000"/>
+                </a:solidFill>
+                <a:latin typeface="Courier New" panose="02070309020205020404" pitchFamily="49" charset="0"/>
+                <a:cs typeface="Courier New" panose="02070309020205020404" pitchFamily="49" charset="0"/>
+              </a:rPr>
+              <a:t> </a:t>
+            </a:r>
+            <a:r>
+              <a:rPr lang="ru-RU" sz="1200" dirty="0" smtClean="0">
+                <a:solidFill>
+                  <a:srgbClr val="000000"/>
+                </a:solidFill>
+                <a:latin typeface="Courier New" panose="02070309020205020404" pitchFamily="49" charset="0"/>
+                <a:cs typeface="Courier New" panose="02070309020205020404" pitchFamily="49" charset="0"/>
+              </a:rPr>
+              <a:t>   </a:t>
+            </a:r>
+            <a:r>
+              <a:rPr lang="en-US" sz="1200" dirty="0" smtClean="0">
+                <a:solidFill>
+                  <a:srgbClr val="008000"/>
+                </a:solidFill>
+                <a:latin typeface="Courier New" panose="02070309020205020404" pitchFamily="49" charset="0"/>
+                <a:cs typeface="Courier New" panose="02070309020205020404" pitchFamily="49" charset="0"/>
+              </a:rPr>
+              <a:t>//</a:t>
+            </a:r>
+            <a:r>
+              <a:rPr lang="en-US" sz="1200" dirty="0">
+                <a:solidFill>
+                  <a:srgbClr val="008000"/>
+                </a:solidFill>
+                <a:latin typeface="Courier New" panose="02070309020205020404" pitchFamily="49" charset="0"/>
+                <a:cs typeface="Courier New" panose="02070309020205020404" pitchFamily="49" charset="0"/>
+              </a:rPr>
+              <a:t> </a:t>
+            </a:r>
+            <a:r>
+              <a:rPr lang="ru-RU" sz="1200" dirty="0">
+                <a:solidFill>
+                  <a:srgbClr val="008000"/>
+                </a:solidFill>
+                <a:latin typeface="Courier New" panose="02070309020205020404" pitchFamily="49" charset="0"/>
+                <a:cs typeface="Courier New" panose="02070309020205020404" pitchFamily="49" charset="0"/>
+              </a:rPr>
+              <a:t>Сохранить информацию </a:t>
+            </a:r>
+            <a:r>
+              <a:rPr lang="ru-RU" sz="1200" dirty="0" smtClean="0">
+                <a:solidFill>
+                  <a:srgbClr val="008000"/>
+                </a:solidFill>
+                <a:latin typeface="Courier New" panose="02070309020205020404" pitchFamily="49" charset="0"/>
+                <a:cs typeface="Courier New" panose="02070309020205020404" pitchFamily="49" charset="0"/>
+              </a:rPr>
+              <a:t>об</a:t>
+            </a:r>
+            <a:r>
+              <a:rPr lang="ru-RU" sz="1200" dirty="0">
+                <a:solidFill>
+                  <a:srgbClr val="008000"/>
+                </a:solidFill>
+                <a:latin typeface="Courier New" panose="02070309020205020404" pitchFamily="49" charset="0"/>
+                <a:cs typeface="Courier New" panose="02070309020205020404" pitchFamily="49" charset="0"/>
+              </a:rPr>
+              <a:t> исключении в </a:t>
+            </a:r>
+            <a:r>
+              <a:rPr lang="ru-RU" sz="1200" dirty="0" smtClean="0">
+                <a:solidFill>
+                  <a:srgbClr val="008000"/>
+                </a:solidFill>
+                <a:latin typeface="Courier New" panose="02070309020205020404" pitchFamily="49" charset="0"/>
+                <a:cs typeface="Courier New" panose="02070309020205020404" pitchFamily="49" charset="0"/>
+              </a:rPr>
+              <a:t>лог</a:t>
+            </a:r>
+          </a:p>
+          <a:p>
+            <a:r>
+              <a:rPr lang="ru-RU" sz="1200" dirty="0" smtClean="0">
+                <a:solidFill>
+                  <a:srgbClr val="000000"/>
+                </a:solidFill>
+                <a:latin typeface="Courier New" panose="02070309020205020404" pitchFamily="49" charset="0"/>
+                <a:cs typeface="Courier New" panose="02070309020205020404" pitchFamily="49" charset="0"/>
+              </a:rPr>
+              <a:t>}</a:t>
+            </a:r>
+            <a:endParaRPr lang="en-US" sz="1200" dirty="0" smtClean="0">
+              <a:solidFill>
+                <a:srgbClr val="000000"/>
+              </a:solidFill>
+              <a:latin typeface="Courier New" panose="02070309020205020404" pitchFamily="49" charset="0"/>
+              <a:cs typeface="Courier New" panose="02070309020205020404" pitchFamily="49" charset="0"/>
+            </a:endParaRPr>
+          </a:p>
+        </p:txBody>
+      </p:sp>
     </p:spTree>
     <p:extLst>
       <p:ext uri="{BB962C8B-B14F-4D97-AF65-F5344CB8AC3E}">
-        <p14:creationId xmlns:p14="http://schemas.microsoft.com/office/powerpoint/2010/main" val="1032801931"/>
+        <p14:creationId xmlns:p14="http://schemas.microsoft.com/office/powerpoint/2010/main" val="2325098032"/>
       </p:ext>
     </p:extLst>
   </p:cSld>
@@ -8048,6 +8657,1362 @@
           <a:lstStyle/>
           <a:p>
             <a:r>
+              <a:rPr lang="ru-RU" dirty="0" smtClean="0"/>
+              <a:t>Отключение </a:t>
+            </a:r>
+            <a:r>
+              <a:rPr lang="en-US" dirty="0" smtClean="0"/>
+              <a:t>WER</a:t>
+            </a:r>
+            <a:endParaRPr lang="en-US" dirty="0"/>
+          </a:p>
+        </p:txBody>
+      </p:sp>
+      <p:sp>
+        <p:nvSpPr>
+          <p:cNvPr id="3" name="Content Placeholder 2"/>
+          <p:cNvSpPr>
+            <a:spLocks noGrp="1"/>
+          </p:cNvSpPr>
+          <p:nvPr>
+            <p:ph idx="1"/>
+          </p:nvPr>
+        </p:nvSpPr>
+        <p:spPr>
+          <a:xfrm>
+            <a:off x="457200" y="1412777"/>
+            <a:ext cx="8229600" cy="936103"/>
+          </a:xfrm>
+        </p:spPr>
+        <p:txBody>
+          <a:bodyPr>
+            <a:normAutofit/>
+          </a:bodyPr>
+          <a:lstStyle/>
+          <a:p>
+            <a:pPr marL="0" indent="0">
+              <a:buNone/>
+            </a:pPr>
+            <a:r>
+              <a:rPr lang="ru-RU" sz="1800" dirty="0" smtClean="0"/>
+              <a:t>При использовании события </a:t>
+            </a:r>
+            <a:r>
+              <a:rPr lang="en-US" sz="1800" dirty="0" err="1"/>
+              <a:t>UnhandledException</a:t>
+            </a:r>
+            <a:r>
+              <a:rPr lang="en-US" sz="1800" dirty="0"/>
+              <a:t> </a:t>
+            </a:r>
+            <a:r>
+              <a:rPr lang="ru-RU" sz="1800" dirty="0" smtClean="0"/>
+              <a:t> вам может понадобиться отключить механизм </a:t>
+            </a:r>
+            <a:r>
+              <a:rPr lang="en-US" sz="1800" dirty="0" smtClean="0"/>
+              <a:t>Windows Error Reporting </a:t>
+            </a:r>
+            <a:r>
+              <a:rPr lang="ru-RU" sz="1800" dirty="0" smtClean="0"/>
+              <a:t>который отправляет отчет об ошибке в </a:t>
+            </a:r>
+            <a:r>
+              <a:rPr lang="en-US" sz="1800" dirty="0" smtClean="0"/>
+              <a:t>Microsoft.</a:t>
+            </a:r>
+            <a:endParaRPr lang="en-US" sz="1800" dirty="0"/>
+          </a:p>
+        </p:txBody>
+      </p:sp>
+      <p:sp>
+        <p:nvSpPr>
+          <p:cNvPr id="5" name="Rectangle 4"/>
+          <p:cNvSpPr/>
+          <p:nvPr/>
+        </p:nvSpPr>
+        <p:spPr>
+          <a:xfrm>
+            <a:off x="457200" y="2483018"/>
+            <a:ext cx="7643192" cy="3970318"/>
+          </a:xfrm>
+          <a:prstGeom prst="rect">
+            <a:avLst/>
+          </a:prstGeom>
+          <a:solidFill>
+            <a:schemeClr val="bg1"/>
+          </a:solidFill>
+        </p:spPr>
+        <p:txBody>
+          <a:bodyPr wrap="square">
+            <a:spAutoFit/>
+          </a:bodyPr>
+          <a:lstStyle/>
+          <a:p>
+            <a:r>
+              <a:rPr lang="en-US" sz="1200" dirty="0">
+                <a:solidFill>
+                  <a:srgbClr val="0000FF"/>
+                </a:solidFill>
+                <a:highlight>
+                  <a:srgbClr val="FFFFFF"/>
+                </a:highlight>
+                <a:latin typeface="Consolas"/>
+              </a:rPr>
+              <a:t>static</a:t>
+            </a:r>
+            <a:r>
+              <a:rPr lang="en-US" sz="1200" dirty="0">
+                <a:solidFill>
+                  <a:srgbClr val="000000"/>
+                </a:solidFill>
+                <a:highlight>
+                  <a:srgbClr val="FFFFFF"/>
+                </a:highlight>
+                <a:latin typeface="Consolas"/>
+              </a:rPr>
+              <a:t> </a:t>
+            </a:r>
+            <a:r>
+              <a:rPr lang="en-US" sz="1200" dirty="0">
+                <a:solidFill>
+                  <a:srgbClr val="0000FF"/>
+                </a:solidFill>
+                <a:highlight>
+                  <a:srgbClr val="FFFFFF"/>
+                </a:highlight>
+                <a:latin typeface="Consolas"/>
+              </a:rPr>
+              <a:t>void</a:t>
+            </a:r>
+            <a:r>
+              <a:rPr lang="en-US" sz="1200" dirty="0">
+                <a:solidFill>
+                  <a:srgbClr val="000000"/>
+                </a:solidFill>
+                <a:highlight>
+                  <a:srgbClr val="FFFFFF"/>
+                </a:highlight>
+                <a:latin typeface="Consolas"/>
+              </a:rPr>
+              <a:t> Main</a:t>
+            </a:r>
+            <a:r>
+              <a:rPr lang="en-US" sz="1200" dirty="0" smtClean="0">
+                <a:solidFill>
+                  <a:srgbClr val="000000"/>
+                </a:solidFill>
+                <a:highlight>
+                  <a:srgbClr val="FFFFFF"/>
+                </a:highlight>
+                <a:latin typeface="Consolas"/>
+              </a:rPr>
+              <a:t>() </a:t>
+            </a:r>
+            <a:r>
+              <a:rPr lang="ru-RU" sz="1200" dirty="0" smtClean="0">
+                <a:solidFill>
+                  <a:srgbClr val="000000"/>
+                </a:solidFill>
+                <a:highlight>
+                  <a:srgbClr val="FFFFFF"/>
+                </a:highlight>
+                <a:latin typeface="Consolas"/>
+              </a:rPr>
+              <a:t>{</a:t>
+            </a:r>
+            <a:endParaRPr lang="ru-RU" sz="1200" dirty="0">
+              <a:solidFill>
+                <a:srgbClr val="000000"/>
+              </a:solidFill>
+              <a:highlight>
+                <a:srgbClr val="FFFFFF"/>
+              </a:highlight>
+              <a:latin typeface="Consolas"/>
+            </a:endParaRPr>
+          </a:p>
+          <a:p>
+            <a:r>
+              <a:rPr lang="en-US" sz="1200" dirty="0" smtClean="0">
+                <a:solidFill>
+                  <a:srgbClr val="000000"/>
+                </a:solidFill>
+                <a:highlight>
+                  <a:srgbClr val="FFFFFF"/>
+                </a:highlight>
+                <a:latin typeface="Consolas"/>
+              </a:rPr>
+              <a:t>    </a:t>
+            </a:r>
+            <a:r>
+              <a:rPr lang="en-US" sz="1200" dirty="0" err="1" smtClean="0">
+                <a:solidFill>
+                  <a:srgbClr val="000000"/>
+                </a:solidFill>
+                <a:highlight>
+                  <a:srgbClr val="FFFFFF"/>
+                </a:highlight>
+                <a:latin typeface="Consolas"/>
+              </a:rPr>
+              <a:t>SetErrorMode</a:t>
+            </a:r>
+            <a:r>
+              <a:rPr lang="en-US" sz="1200" dirty="0">
+                <a:solidFill>
+                  <a:srgbClr val="000000"/>
+                </a:solidFill>
+                <a:highlight>
+                  <a:srgbClr val="FFFFFF"/>
+                </a:highlight>
+                <a:latin typeface="Consolas"/>
+              </a:rPr>
+              <a:t>(</a:t>
+            </a:r>
+          </a:p>
+          <a:p>
+            <a:r>
+              <a:rPr lang="en-US" sz="1200" dirty="0" smtClean="0">
+                <a:solidFill>
+                  <a:srgbClr val="000000"/>
+                </a:solidFill>
+                <a:highlight>
+                  <a:srgbClr val="FFFFFF"/>
+                </a:highlight>
+                <a:latin typeface="Consolas"/>
+              </a:rPr>
+              <a:t>        </a:t>
+            </a:r>
+            <a:r>
+              <a:rPr lang="en-US" sz="1200" dirty="0" err="1" smtClean="0">
+                <a:solidFill>
+                  <a:srgbClr val="000000"/>
+                </a:solidFill>
+                <a:highlight>
+                  <a:srgbClr val="FFFFFF"/>
+                </a:highlight>
+                <a:latin typeface="Consolas"/>
+              </a:rPr>
+              <a:t>SetErrorMode</a:t>
+            </a:r>
+            <a:r>
+              <a:rPr lang="en-US" sz="1200" dirty="0" smtClean="0">
+                <a:solidFill>
+                  <a:srgbClr val="000000"/>
+                </a:solidFill>
+                <a:highlight>
+                  <a:srgbClr val="FFFFFF"/>
+                </a:highlight>
+                <a:latin typeface="Consolas"/>
+              </a:rPr>
+              <a:t>(</a:t>
+            </a:r>
+            <a:r>
+              <a:rPr lang="en-US" sz="1200" dirty="0" err="1" smtClean="0">
+                <a:solidFill>
+                  <a:srgbClr val="2B91AF"/>
+                </a:solidFill>
+                <a:highlight>
+                  <a:srgbClr val="FFFFFF"/>
+                </a:highlight>
+                <a:latin typeface="Consolas"/>
+              </a:rPr>
+              <a:t>ErrorModes</a:t>
+            </a:r>
+            <a:r>
+              <a:rPr lang="en-US" sz="1200" dirty="0" err="1" smtClean="0">
+                <a:solidFill>
+                  <a:srgbClr val="000000"/>
+                </a:solidFill>
+                <a:highlight>
+                  <a:srgbClr val="FFFFFF"/>
+                </a:highlight>
+                <a:latin typeface="Consolas"/>
+              </a:rPr>
+              <a:t>.SYSTEM_DEFAULT</a:t>
+            </a:r>
+            <a:r>
+              <a:rPr lang="en-US" sz="1200" dirty="0">
+                <a:solidFill>
+                  <a:srgbClr val="000000"/>
+                </a:solidFill>
+                <a:highlight>
+                  <a:srgbClr val="FFFFFF"/>
+                </a:highlight>
+                <a:latin typeface="Consolas"/>
+              </a:rPr>
+              <a:t>)</a:t>
+            </a:r>
+          </a:p>
+          <a:p>
+            <a:r>
+              <a:rPr lang="en-US" sz="1200" dirty="0" smtClean="0">
+                <a:solidFill>
+                  <a:srgbClr val="000000"/>
+                </a:solidFill>
+                <a:highlight>
+                  <a:srgbClr val="FFFFFF"/>
+                </a:highlight>
+                <a:latin typeface="Consolas"/>
+              </a:rPr>
+              <a:t>        | </a:t>
+            </a:r>
+            <a:r>
+              <a:rPr lang="en-US" sz="1200" dirty="0" err="1">
+                <a:solidFill>
+                  <a:srgbClr val="2B91AF"/>
+                </a:solidFill>
+                <a:highlight>
+                  <a:srgbClr val="FFFFFF"/>
+                </a:highlight>
+                <a:latin typeface="Consolas"/>
+              </a:rPr>
+              <a:t>ErrorModes</a:t>
+            </a:r>
+            <a:r>
+              <a:rPr lang="en-US" sz="1200" dirty="0" err="1">
+                <a:solidFill>
+                  <a:srgbClr val="000000"/>
+                </a:solidFill>
+                <a:highlight>
+                  <a:srgbClr val="FFFFFF"/>
+                </a:highlight>
+                <a:latin typeface="Consolas"/>
+              </a:rPr>
+              <a:t>.SEM_NOGPFAULTERRORBOX</a:t>
+            </a:r>
+            <a:endParaRPr lang="en-US" sz="1200" dirty="0">
+              <a:solidFill>
+                <a:srgbClr val="000000"/>
+              </a:solidFill>
+              <a:highlight>
+                <a:srgbClr val="FFFFFF"/>
+              </a:highlight>
+              <a:latin typeface="Consolas"/>
+            </a:endParaRPr>
+          </a:p>
+          <a:p>
+            <a:r>
+              <a:rPr lang="en-US" sz="1200" dirty="0" smtClean="0">
+                <a:solidFill>
+                  <a:srgbClr val="000000"/>
+                </a:solidFill>
+                <a:highlight>
+                  <a:srgbClr val="FFFFFF"/>
+                </a:highlight>
+                <a:latin typeface="Consolas"/>
+              </a:rPr>
+              <a:t>        | </a:t>
+            </a:r>
+            <a:r>
+              <a:rPr lang="en-US" sz="1200" dirty="0" err="1">
+                <a:solidFill>
+                  <a:srgbClr val="2B91AF"/>
+                </a:solidFill>
+                <a:highlight>
+                  <a:srgbClr val="FFFFFF"/>
+                </a:highlight>
+                <a:latin typeface="Consolas"/>
+              </a:rPr>
+              <a:t>ErrorModes</a:t>
+            </a:r>
+            <a:r>
+              <a:rPr lang="en-US" sz="1200" dirty="0" err="1">
+                <a:solidFill>
+                  <a:srgbClr val="000000"/>
+                </a:solidFill>
+                <a:highlight>
+                  <a:srgbClr val="FFFFFF"/>
+                </a:highlight>
+                <a:latin typeface="Consolas"/>
+              </a:rPr>
+              <a:t>.SEM_FAILCRITICALERRORS</a:t>
+            </a:r>
+            <a:endParaRPr lang="en-US" sz="1200" dirty="0">
+              <a:solidFill>
+                <a:srgbClr val="000000"/>
+              </a:solidFill>
+              <a:highlight>
+                <a:srgbClr val="FFFFFF"/>
+              </a:highlight>
+              <a:latin typeface="Consolas"/>
+            </a:endParaRPr>
+          </a:p>
+          <a:p>
+            <a:r>
+              <a:rPr lang="en-US" sz="1200" dirty="0" smtClean="0">
+                <a:solidFill>
+                  <a:srgbClr val="000000"/>
+                </a:solidFill>
+                <a:highlight>
+                  <a:srgbClr val="FFFFFF"/>
+                </a:highlight>
+                <a:latin typeface="Consolas"/>
+              </a:rPr>
+              <a:t>        | </a:t>
+            </a:r>
+            <a:r>
+              <a:rPr lang="en-US" sz="1200" dirty="0" err="1">
+                <a:solidFill>
+                  <a:srgbClr val="2B91AF"/>
+                </a:solidFill>
+                <a:highlight>
+                  <a:srgbClr val="FFFFFF"/>
+                </a:highlight>
+                <a:latin typeface="Consolas"/>
+              </a:rPr>
+              <a:t>ErrorModes</a:t>
+            </a:r>
+            <a:r>
+              <a:rPr lang="en-US" sz="1200" dirty="0" err="1">
+                <a:solidFill>
+                  <a:srgbClr val="000000"/>
+                </a:solidFill>
+                <a:highlight>
+                  <a:srgbClr val="FFFFFF"/>
+                </a:highlight>
+                <a:latin typeface="Consolas"/>
+              </a:rPr>
+              <a:t>.SEM_NOOPENFILEERRORBOX</a:t>
+            </a:r>
+            <a:endParaRPr lang="en-US" sz="1200" dirty="0">
+              <a:solidFill>
+                <a:srgbClr val="000000"/>
+              </a:solidFill>
+              <a:highlight>
+                <a:srgbClr val="FFFFFF"/>
+              </a:highlight>
+              <a:latin typeface="Consolas"/>
+            </a:endParaRPr>
+          </a:p>
+          <a:p>
+            <a:r>
+              <a:rPr lang="en-US" sz="1200" dirty="0" smtClean="0">
+                <a:solidFill>
+                  <a:srgbClr val="000000"/>
+                </a:solidFill>
+                <a:highlight>
+                  <a:srgbClr val="FFFFFF"/>
+                </a:highlight>
+                <a:latin typeface="Consolas"/>
+              </a:rPr>
+              <a:t>    </a:t>
+            </a:r>
+            <a:r>
+              <a:rPr lang="ru-RU" sz="1200" dirty="0" smtClean="0">
+                <a:solidFill>
+                  <a:srgbClr val="000000"/>
+                </a:solidFill>
+                <a:highlight>
+                  <a:srgbClr val="FFFFFF"/>
+                </a:highlight>
+                <a:latin typeface="Consolas"/>
+              </a:rPr>
+              <a:t>);</a:t>
+            </a:r>
+            <a:endParaRPr lang="ru-RU" sz="1200" dirty="0">
+              <a:solidFill>
+                <a:srgbClr val="000000"/>
+              </a:solidFill>
+              <a:highlight>
+                <a:srgbClr val="FFFFFF"/>
+              </a:highlight>
+              <a:latin typeface="Consolas"/>
+            </a:endParaRPr>
+          </a:p>
+          <a:p>
+            <a:r>
+              <a:rPr lang="en-US" sz="1200" dirty="0" smtClean="0">
+                <a:solidFill>
+                  <a:srgbClr val="008000"/>
+                </a:solidFill>
+                <a:highlight>
+                  <a:srgbClr val="FFFFFF"/>
+                </a:highlight>
+                <a:latin typeface="Consolas"/>
+              </a:rPr>
+              <a:t>    </a:t>
+            </a:r>
+            <a:r>
+              <a:rPr lang="ru-RU" sz="1200" dirty="0" smtClean="0">
+                <a:solidFill>
+                  <a:srgbClr val="008000"/>
+                </a:solidFill>
+                <a:highlight>
+                  <a:srgbClr val="FFFFFF"/>
+                </a:highlight>
+                <a:latin typeface="Consolas"/>
+              </a:rPr>
+              <a:t>// </a:t>
+            </a:r>
+            <a:r>
+              <a:rPr lang="ru-RU" sz="1200" dirty="0">
+                <a:solidFill>
+                  <a:srgbClr val="008000"/>
+                </a:solidFill>
+                <a:highlight>
+                  <a:srgbClr val="FFFFFF"/>
+                </a:highlight>
+                <a:latin typeface="Consolas"/>
+              </a:rPr>
+              <a:t>Код приложения ...</a:t>
+            </a:r>
+            <a:endParaRPr lang="ru-RU" sz="1200" dirty="0">
+              <a:solidFill>
+                <a:srgbClr val="000000"/>
+              </a:solidFill>
+              <a:highlight>
+                <a:srgbClr val="FFFFFF"/>
+              </a:highlight>
+              <a:latin typeface="Consolas"/>
+            </a:endParaRPr>
+          </a:p>
+          <a:p>
+            <a:r>
+              <a:rPr lang="ru-RU" sz="1200" dirty="0" smtClean="0">
+                <a:solidFill>
+                  <a:srgbClr val="000000"/>
+                </a:solidFill>
+                <a:highlight>
+                  <a:srgbClr val="FFFFFF"/>
+                </a:highlight>
+                <a:latin typeface="Consolas"/>
+              </a:rPr>
+              <a:t>}</a:t>
+            </a:r>
+            <a:endParaRPr lang="en-US" sz="1200" dirty="0" smtClean="0">
+              <a:solidFill>
+                <a:srgbClr val="000000"/>
+              </a:solidFill>
+              <a:highlight>
+                <a:srgbClr val="FFFFFF"/>
+              </a:highlight>
+              <a:latin typeface="Consolas"/>
+            </a:endParaRPr>
+          </a:p>
+          <a:p>
+            <a:endParaRPr lang="en-US" sz="1200" dirty="0" smtClean="0">
+              <a:solidFill>
+                <a:srgbClr val="000000"/>
+              </a:solidFill>
+              <a:highlight>
+                <a:srgbClr val="FFFFFF"/>
+              </a:highlight>
+              <a:latin typeface="Consolas"/>
+            </a:endParaRPr>
+          </a:p>
+          <a:p>
+            <a:r>
+              <a:rPr lang="en-US" sz="1200" dirty="0" smtClean="0">
+                <a:solidFill>
+                  <a:srgbClr val="000000"/>
+                </a:solidFill>
+                <a:highlight>
+                  <a:srgbClr val="FFFFFF"/>
+                </a:highlight>
+                <a:latin typeface="Consolas"/>
+              </a:rPr>
+              <a:t>[</a:t>
+            </a:r>
+            <a:r>
+              <a:rPr lang="en-US" sz="1200" dirty="0" err="1">
+                <a:solidFill>
+                  <a:srgbClr val="2B91AF"/>
+                </a:solidFill>
+                <a:highlight>
+                  <a:srgbClr val="FFFFFF"/>
+                </a:highlight>
+                <a:latin typeface="Consolas"/>
+              </a:rPr>
+              <a:t>DllImport</a:t>
+            </a:r>
+            <a:r>
+              <a:rPr lang="en-US" sz="1200" dirty="0">
+                <a:solidFill>
+                  <a:srgbClr val="000000"/>
+                </a:solidFill>
+                <a:highlight>
+                  <a:srgbClr val="FFFFFF"/>
+                </a:highlight>
+                <a:latin typeface="Consolas"/>
+              </a:rPr>
+              <a:t>(</a:t>
+            </a:r>
+            <a:r>
+              <a:rPr lang="en-US" sz="1200" dirty="0">
+                <a:solidFill>
+                  <a:srgbClr val="A31515"/>
+                </a:solidFill>
+                <a:highlight>
+                  <a:srgbClr val="FFFFFF"/>
+                </a:highlight>
+                <a:latin typeface="Consolas"/>
+              </a:rPr>
+              <a:t>"kernel32.dll"</a:t>
+            </a:r>
+            <a:r>
+              <a:rPr lang="en-US" sz="1200" dirty="0">
+                <a:solidFill>
+                  <a:srgbClr val="000000"/>
+                </a:solidFill>
+                <a:highlight>
+                  <a:srgbClr val="FFFFFF"/>
+                </a:highlight>
+                <a:latin typeface="Consolas"/>
+              </a:rPr>
+              <a:t>)]</a:t>
+            </a:r>
+          </a:p>
+          <a:p>
+            <a:r>
+              <a:rPr lang="en-US" sz="1200" dirty="0">
+                <a:solidFill>
+                  <a:srgbClr val="0000FF"/>
+                </a:solidFill>
+                <a:highlight>
+                  <a:srgbClr val="FFFFFF"/>
+                </a:highlight>
+                <a:latin typeface="Consolas"/>
+              </a:rPr>
+              <a:t>internal</a:t>
+            </a:r>
+            <a:r>
+              <a:rPr lang="en-US" sz="1200" dirty="0">
+                <a:solidFill>
+                  <a:srgbClr val="000000"/>
+                </a:solidFill>
+                <a:highlight>
+                  <a:srgbClr val="FFFFFF"/>
+                </a:highlight>
+                <a:latin typeface="Consolas"/>
+              </a:rPr>
+              <a:t> </a:t>
+            </a:r>
+            <a:r>
+              <a:rPr lang="en-US" sz="1200" dirty="0">
+                <a:solidFill>
+                  <a:srgbClr val="0000FF"/>
+                </a:solidFill>
+                <a:highlight>
+                  <a:srgbClr val="FFFFFF"/>
+                </a:highlight>
+                <a:latin typeface="Consolas"/>
+              </a:rPr>
+              <a:t>static</a:t>
+            </a:r>
+            <a:r>
+              <a:rPr lang="en-US" sz="1200" dirty="0">
+                <a:solidFill>
+                  <a:srgbClr val="000000"/>
+                </a:solidFill>
+                <a:highlight>
+                  <a:srgbClr val="FFFFFF"/>
+                </a:highlight>
+                <a:latin typeface="Consolas"/>
+              </a:rPr>
+              <a:t> </a:t>
+            </a:r>
+            <a:r>
+              <a:rPr lang="en-US" sz="1200" dirty="0">
+                <a:solidFill>
+                  <a:srgbClr val="0000FF"/>
+                </a:solidFill>
+                <a:highlight>
+                  <a:srgbClr val="FFFFFF"/>
+                </a:highlight>
+                <a:latin typeface="Consolas"/>
+              </a:rPr>
+              <a:t>extern</a:t>
+            </a:r>
+            <a:r>
+              <a:rPr lang="en-US" sz="1200" dirty="0">
+                <a:solidFill>
+                  <a:srgbClr val="000000"/>
+                </a:solidFill>
+                <a:highlight>
+                  <a:srgbClr val="FFFFFF"/>
+                </a:highlight>
+                <a:latin typeface="Consolas"/>
+              </a:rPr>
+              <a:t> </a:t>
+            </a:r>
+            <a:r>
+              <a:rPr lang="en-US" sz="1200" dirty="0" err="1">
+                <a:solidFill>
+                  <a:srgbClr val="2B91AF"/>
+                </a:solidFill>
+                <a:highlight>
+                  <a:srgbClr val="FFFFFF"/>
+                </a:highlight>
+                <a:latin typeface="Consolas"/>
+              </a:rPr>
+              <a:t>Program</a:t>
+            </a:r>
+            <a:r>
+              <a:rPr lang="en-US" sz="1200" dirty="0" err="1">
+                <a:solidFill>
+                  <a:srgbClr val="000000"/>
+                </a:solidFill>
+                <a:highlight>
+                  <a:srgbClr val="FFFFFF"/>
+                </a:highlight>
+                <a:latin typeface="Consolas"/>
+              </a:rPr>
+              <a:t>.</a:t>
+            </a:r>
+            <a:r>
+              <a:rPr lang="en-US" sz="1200" dirty="0" err="1">
+                <a:solidFill>
+                  <a:srgbClr val="2B91AF"/>
+                </a:solidFill>
+                <a:highlight>
+                  <a:srgbClr val="FFFFFF"/>
+                </a:highlight>
+                <a:latin typeface="Consolas"/>
+              </a:rPr>
+              <a:t>ErrorModes</a:t>
+            </a:r>
+            <a:r>
+              <a:rPr lang="en-US" sz="1200" dirty="0">
+                <a:solidFill>
+                  <a:srgbClr val="000000"/>
+                </a:solidFill>
+                <a:highlight>
+                  <a:srgbClr val="FFFFFF"/>
+                </a:highlight>
+                <a:latin typeface="Consolas"/>
+              </a:rPr>
+              <a:t> </a:t>
+            </a:r>
+            <a:r>
+              <a:rPr lang="en-US" sz="1200" dirty="0" err="1">
+                <a:solidFill>
+                  <a:srgbClr val="000000"/>
+                </a:solidFill>
+                <a:highlight>
+                  <a:srgbClr val="FFFFFF"/>
+                </a:highlight>
+                <a:latin typeface="Consolas"/>
+              </a:rPr>
+              <a:t>SetErrorMode</a:t>
+            </a:r>
+            <a:r>
+              <a:rPr lang="en-US" sz="1200" dirty="0">
+                <a:solidFill>
+                  <a:srgbClr val="000000"/>
+                </a:solidFill>
+                <a:highlight>
+                  <a:srgbClr val="FFFFFF"/>
+                </a:highlight>
+                <a:latin typeface="Consolas"/>
+              </a:rPr>
+              <a:t>(</a:t>
+            </a:r>
+            <a:r>
+              <a:rPr lang="en-US" sz="1200" dirty="0" err="1">
+                <a:solidFill>
+                  <a:srgbClr val="2B91AF"/>
+                </a:solidFill>
+                <a:highlight>
+                  <a:srgbClr val="FFFFFF"/>
+                </a:highlight>
+                <a:latin typeface="Consolas"/>
+              </a:rPr>
+              <a:t>ErrorModes</a:t>
+            </a:r>
+            <a:r>
+              <a:rPr lang="en-US" sz="1200" dirty="0">
+                <a:solidFill>
+                  <a:srgbClr val="000000"/>
+                </a:solidFill>
+                <a:highlight>
+                  <a:srgbClr val="FFFFFF"/>
+                </a:highlight>
+                <a:latin typeface="Consolas"/>
+              </a:rPr>
+              <a:t> mode);</a:t>
+            </a:r>
+          </a:p>
+          <a:p>
+            <a:endParaRPr lang="ru-RU" sz="1200" dirty="0">
+              <a:solidFill>
+                <a:srgbClr val="000000"/>
+              </a:solidFill>
+              <a:highlight>
+                <a:srgbClr val="FFFFFF"/>
+              </a:highlight>
+              <a:latin typeface="Consolas"/>
+            </a:endParaRPr>
+          </a:p>
+          <a:p>
+            <a:r>
+              <a:rPr lang="en-US" sz="1200" dirty="0">
+                <a:solidFill>
+                  <a:srgbClr val="000000"/>
+                </a:solidFill>
+                <a:highlight>
+                  <a:srgbClr val="FFFFFF"/>
+                </a:highlight>
+                <a:latin typeface="Consolas"/>
+              </a:rPr>
+              <a:t>[</a:t>
+            </a:r>
+            <a:r>
+              <a:rPr lang="en-US" sz="1200" dirty="0">
+                <a:solidFill>
+                  <a:srgbClr val="2B91AF"/>
+                </a:solidFill>
+                <a:highlight>
+                  <a:srgbClr val="FFFFFF"/>
+                </a:highlight>
+                <a:latin typeface="Consolas"/>
+              </a:rPr>
+              <a:t>Flags</a:t>
+            </a:r>
+            <a:r>
+              <a:rPr lang="en-US" sz="1200" dirty="0">
+                <a:solidFill>
+                  <a:srgbClr val="000000"/>
+                </a:solidFill>
+                <a:highlight>
+                  <a:srgbClr val="FFFFFF"/>
+                </a:highlight>
+                <a:latin typeface="Consolas"/>
+              </a:rPr>
+              <a:t>]</a:t>
+            </a:r>
+          </a:p>
+          <a:p>
+            <a:r>
+              <a:rPr lang="en-US" sz="1200" dirty="0">
+                <a:solidFill>
+                  <a:srgbClr val="0000FF"/>
+                </a:solidFill>
+                <a:highlight>
+                  <a:srgbClr val="FFFFFF"/>
+                </a:highlight>
+                <a:latin typeface="Consolas"/>
+              </a:rPr>
+              <a:t>internal</a:t>
+            </a:r>
+            <a:r>
+              <a:rPr lang="en-US" sz="1200" dirty="0">
+                <a:solidFill>
+                  <a:srgbClr val="000000"/>
+                </a:solidFill>
+                <a:highlight>
+                  <a:srgbClr val="FFFFFF"/>
+                </a:highlight>
+                <a:latin typeface="Consolas"/>
+              </a:rPr>
+              <a:t> </a:t>
+            </a:r>
+            <a:r>
+              <a:rPr lang="en-US" sz="1200" dirty="0" err="1">
+                <a:solidFill>
+                  <a:srgbClr val="0000FF"/>
+                </a:solidFill>
+                <a:highlight>
+                  <a:srgbClr val="FFFFFF"/>
+                </a:highlight>
+                <a:latin typeface="Consolas"/>
+              </a:rPr>
+              <a:t>enum</a:t>
+            </a:r>
+            <a:r>
+              <a:rPr lang="en-US" sz="1200" dirty="0">
+                <a:solidFill>
+                  <a:srgbClr val="000000"/>
+                </a:solidFill>
+                <a:highlight>
+                  <a:srgbClr val="FFFFFF"/>
+                </a:highlight>
+                <a:latin typeface="Consolas"/>
+              </a:rPr>
+              <a:t> </a:t>
+            </a:r>
+            <a:r>
+              <a:rPr lang="en-US" sz="1200" dirty="0" err="1">
+                <a:solidFill>
+                  <a:srgbClr val="2B91AF"/>
+                </a:solidFill>
+                <a:highlight>
+                  <a:srgbClr val="FFFFFF"/>
+                </a:highlight>
+                <a:latin typeface="Consolas"/>
+              </a:rPr>
+              <a:t>ErrorModes</a:t>
+            </a:r>
+            <a:r>
+              <a:rPr lang="en-US" sz="1200" dirty="0">
+                <a:solidFill>
+                  <a:srgbClr val="000000"/>
+                </a:solidFill>
+                <a:highlight>
+                  <a:srgbClr val="FFFFFF"/>
+                </a:highlight>
+                <a:latin typeface="Consolas"/>
+              </a:rPr>
+              <a:t> : </a:t>
+            </a:r>
+            <a:r>
+              <a:rPr lang="en-US" sz="1200" dirty="0" err="1" smtClean="0">
+                <a:solidFill>
+                  <a:srgbClr val="0000FF"/>
+                </a:solidFill>
+                <a:highlight>
+                  <a:srgbClr val="FFFFFF"/>
+                </a:highlight>
+                <a:latin typeface="Consolas"/>
+              </a:rPr>
+              <a:t>uint</a:t>
+            </a:r>
+            <a:r>
+              <a:rPr lang="en-US" sz="1200" dirty="0" smtClean="0">
+                <a:solidFill>
+                  <a:srgbClr val="0000FF"/>
+                </a:solidFill>
+                <a:highlight>
+                  <a:srgbClr val="FFFFFF"/>
+                </a:highlight>
+                <a:latin typeface="Consolas"/>
+              </a:rPr>
+              <a:t> </a:t>
+            </a:r>
+            <a:r>
+              <a:rPr lang="ru-RU" sz="1200" dirty="0" smtClean="0">
+                <a:solidFill>
+                  <a:srgbClr val="000000"/>
+                </a:solidFill>
+                <a:highlight>
+                  <a:srgbClr val="FFFFFF"/>
+                </a:highlight>
+                <a:latin typeface="Consolas"/>
+              </a:rPr>
+              <a:t>{</a:t>
+            </a:r>
+            <a:endParaRPr lang="ru-RU" sz="1200" dirty="0">
+              <a:solidFill>
+                <a:srgbClr val="000000"/>
+              </a:solidFill>
+              <a:highlight>
+                <a:srgbClr val="FFFFFF"/>
+              </a:highlight>
+              <a:latin typeface="Consolas"/>
+            </a:endParaRPr>
+          </a:p>
+          <a:p>
+            <a:r>
+              <a:rPr lang="en-US" sz="1200" dirty="0" smtClean="0">
+                <a:solidFill>
+                  <a:srgbClr val="000000"/>
+                </a:solidFill>
+                <a:highlight>
+                  <a:srgbClr val="FFFFFF"/>
+                </a:highlight>
+                <a:latin typeface="Consolas"/>
+              </a:rPr>
+              <a:t>    SYSTEM_DEFAULT </a:t>
+            </a:r>
+            <a:r>
+              <a:rPr lang="en-US" sz="1200" dirty="0">
+                <a:solidFill>
+                  <a:srgbClr val="000000"/>
+                </a:solidFill>
+                <a:highlight>
+                  <a:srgbClr val="FFFFFF"/>
+                </a:highlight>
+                <a:latin typeface="Consolas"/>
+              </a:rPr>
+              <a:t>= 0x0,</a:t>
+            </a:r>
+          </a:p>
+          <a:p>
+            <a:r>
+              <a:rPr lang="en-US" sz="1200" dirty="0" smtClean="0">
+                <a:solidFill>
+                  <a:srgbClr val="000000"/>
+                </a:solidFill>
+                <a:highlight>
+                  <a:srgbClr val="FFFFFF"/>
+                </a:highlight>
+                <a:latin typeface="Consolas"/>
+              </a:rPr>
+              <a:t>    SEM_FAILCRITICALERRORS </a:t>
+            </a:r>
+            <a:r>
+              <a:rPr lang="en-US" sz="1200" dirty="0">
+                <a:solidFill>
+                  <a:srgbClr val="000000"/>
+                </a:solidFill>
+                <a:highlight>
+                  <a:srgbClr val="FFFFFF"/>
+                </a:highlight>
+                <a:latin typeface="Consolas"/>
+              </a:rPr>
+              <a:t>= 0x0001,</a:t>
+            </a:r>
+          </a:p>
+          <a:p>
+            <a:r>
+              <a:rPr lang="en-US" sz="1200" dirty="0" smtClean="0">
+                <a:solidFill>
+                  <a:srgbClr val="000000"/>
+                </a:solidFill>
+                <a:highlight>
+                  <a:srgbClr val="FFFFFF"/>
+                </a:highlight>
+                <a:latin typeface="Consolas"/>
+              </a:rPr>
+              <a:t>    SEM_NOALIGNMENTFAULTEXCEPT </a:t>
+            </a:r>
+            <a:r>
+              <a:rPr lang="en-US" sz="1200" dirty="0">
+                <a:solidFill>
+                  <a:srgbClr val="000000"/>
+                </a:solidFill>
+                <a:highlight>
+                  <a:srgbClr val="FFFFFF"/>
+                </a:highlight>
+                <a:latin typeface="Consolas"/>
+              </a:rPr>
+              <a:t>= 0x0004,</a:t>
+            </a:r>
+          </a:p>
+          <a:p>
+            <a:r>
+              <a:rPr lang="en-US" sz="1200" dirty="0" smtClean="0">
+                <a:solidFill>
+                  <a:srgbClr val="000000"/>
+                </a:solidFill>
+                <a:highlight>
+                  <a:srgbClr val="FFFFFF"/>
+                </a:highlight>
+                <a:latin typeface="Consolas"/>
+              </a:rPr>
+              <a:t>    SEM_NOGPFAULTERRORBOX </a:t>
+            </a:r>
+            <a:r>
+              <a:rPr lang="en-US" sz="1200" dirty="0">
+                <a:solidFill>
+                  <a:srgbClr val="000000"/>
+                </a:solidFill>
+                <a:highlight>
+                  <a:srgbClr val="FFFFFF"/>
+                </a:highlight>
+                <a:latin typeface="Consolas"/>
+              </a:rPr>
+              <a:t>= 0x0002,</a:t>
+            </a:r>
+          </a:p>
+          <a:p>
+            <a:r>
+              <a:rPr lang="en-US" sz="1200" dirty="0" smtClean="0">
+                <a:solidFill>
+                  <a:srgbClr val="000000"/>
+                </a:solidFill>
+                <a:highlight>
+                  <a:srgbClr val="FFFFFF"/>
+                </a:highlight>
+                <a:latin typeface="Consolas"/>
+              </a:rPr>
+              <a:t>    SEM_NOOPENFILEERRORBOX </a:t>
+            </a:r>
+            <a:r>
+              <a:rPr lang="en-US" sz="1200" dirty="0">
+                <a:solidFill>
+                  <a:srgbClr val="000000"/>
+                </a:solidFill>
+                <a:highlight>
+                  <a:srgbClr val="FFFFFF"/>
+                </a:highlight>
+                <a:latin typeface="Consolas"/>
+              </a:rPr>
+              <a:t>= 0x8000</a:t>
+            </a:r>
+          </a:p>
+          <a:p>
+            <a:r>
+              <a:rPr lang="ru-RU" sz="1200" dirty="0" smtClean="0">
+                <a:solidFill>
+                  <a:srgbClr val="000000"/>
+                </a:solidFill>
+                <a:highlight>
+                  <a:srgbClr val="FFFFFF"/>
+                </a:highlight>
+                <a:latin typeface="Consolas"/>
+              </a:rPr>
+              <a:t>}</a:t>
+            </a:r>
+            <a:endParaRPr lang="ru-RU" sz="1200" dirty="0">
+              <a:solidFill>
+                <a:srgbClr val="000000"/>
+              </a:solidFill>
+              <a:highlight>
+                <a:srgbClr val="FFFFFF"/>
+              </a:highlight>
+              <a:latin typeface="Consolas"/>
+            </a:endParaRPr>
+          </a:p>
+        </p:txBody>
+      </p:sp>
+    </p:spTree>
+    <p:extLst>
+      <p:ext uri="{BB962C8B-B14F-4D97-AF65-F5344CB8AC3E}">
+        <p14:creationId xmlns:p14="http://schemas.microsoft.com/office/powerpoint/2010/main" val="1032801931"/>
+      </p:ext>
+    </p:extLst>
+  </p:cSld>
+  <p:clrMapOvr>
+    <a:masterClrMapping/>
+  </p:clrMapOvr>
+  <p:timing>
+    <p:tnLst>
+      <p:par>
+        <p:cTn id="1" dur="indefinite" restart="never" nodeType="tmRoot"/>
+      </p:par>
+    </p:tnLst>
+  </p:timing>
+</p:sld>
+</file>
+
+<file path=ppt/slides/slide15.xml><?xml version="1.0" encoding="utf-8"?>
+<p:sld xmlns:a="http://schemas.openxmlformats.org/drawingml/2006/main" xmlns:r="http://schemas.openxmlformats.org/officeDocument/2006/relationships" xmlns:p="http://schemas.openxmlformats.org/presentationml/2006/main">
+  <p:cSld>
+    <p:spTree>
+      <p:nvGrpSpPr>
+        <p:cNvPr id="1" name=""/>
+        <p:cNvGrpSpPr/>
+        <p:nvPr/>
+      </p:nvGrpSpPr>
+      <p:grpSpPr>
+        <a:xfrm>
+          <a:off x="0" y="0"/>
+          <a:ext cx="0" cy="0"/>
+          <a:chOff x="0" y="0"/>
+          <a:chExt cx="0" cy="0"/>
+        </a:xfrm>
+      </p:grpSpPr>
+      <p:sp>
+        <p:nvSpPr>
+          <p:cNvPr id="2" name="Title 1"/>
+          <p:cNvSpPr>
+            <a:spLocks noGrp="1"/>
+          </p:cNvSpPr>
+          <p:nvPr>
+            <p:ph type="title"/>
+          </p:nvPr>
+        </p:nvSpPr>
+        <p:spPr/>
+        <p:txBody>
+          <a:bodyPr>
+            <a:normAutofit/>
+          </a:bodyPr>
+          <a:lstStyle/>
+          <a:p>
+            <a:r>
+              <a:rPr lang="ru-RU" dirty="0" smtClean="0"/>
+              <a:t>Окно </a:t>
+            </a:r>
+            <a:r>
+              <a:rPr lang="en-US" dirty="0" smtClean="0"/>
+              <a:t>Debug -&gt; Exceptions ...</a:t>
+            </a:r>
+            <a:endParaRPr lang="en-US" dirty="0"/>
+          </a:p>
+        </p:txBody>
+      </p:sp>
+      <p:sp>
+        <p:nvSpPr>
+          <p:cNvPr id="3" name="Content Placeholder 2"/>
+          <p:cNvSpPr>
+            <a:spLocks noGrp="1"/>
+          </p:cNvSpPr>
+          <p:nvPr>
+            <p:ph idx="1"/>
+          </p:nvPr>
+        </p:nvSpPr>
+        <p:spPr>
+          <a:xfrm>
+            <a:off x="457200" y="1412776"/>
+            <a:ext cx="8229600" cy="4525963"/>
+          </a:xfrm>
+        </p:spPr>
+        <p:txBody>
+          <a:bodyPr>
+            <a:normAutofit/>
+          </a:bodyPr>
+          <a:lstStyle/>
+          <a:p>
+            <a:pPr marL="0" indent="0">
+              <a:buNone/>
+            </a:pPr>
+            <a:r>
+              <a:rPr lang="ru-RU" sz="1800" dirty="0" smtClean="0"/>
+              <a:t>Окно «</a:t>
+            </a:r>
+            <a:r>
+              <a:rPr lang="en-US" sz="1800" dirty="0" smtClean="0"/>
+              <a:t>Debug </a:t>
+            </a:r>
+            <a:r>
+              <a:rPr lang="en-US" sz="1800" dirty="0"/>
+              <a:t>-&gt; Exceptions </a:t>
+            </a:r>
+            <a:r>
+              <a:rPr lang="en-US" sz="1800" dirty="0" smtClean="0"/>
+              <a:t>...</a:t>
+            </a:r>
+            <a:r>
+              <a:rPr lang="ru-RU" sz="1800" dirty="0" smtClean="0"/>
+              <a:t>» контролирует поведение отладчика при генерации исключений. По умолчанию остановка будет происходить только если исключение не было обработано. Иногда возникает необходимость делать остановку как только исключения было сгенерировано. Для этого нужно поставить отметку в колонке «</a:t>
+            </a:r>
+            <a:r>
+              <a:rPr lang="en-US" sz="1800" dirty="0" smtClean="0"/>
+              <a:t>Thrown</a:t>
+            </a:r>
+            <a:r>
+              <a:rPr lang="ru-RU" sz="1800" dirty="0" smtClean="0"/>
+              <a:t>» в ветке «</a:t>
+            </a:r>
+            <a:r>
+              <a:rPr lang="en-US" sz="1800" dirty="0" smtClean="0"/>
+              <a:t>Common Language Runtime Exceptions</a:t>
+            </a:r>
+            <a:r>
+              <a:rPr lang="ru-RU" sz="1800" dirty="0" smtClean="0"/>
+              <a:t>»</a:t>
+            </a:r>
+            <a:r>
+              <a:rPr lang="en-US" sz="1800" dirty="0"/>
+              <a:t> </a:t>
+            </a:r>
+            <a:r>
+              <a:rPr lang="ru-RU" sz="1800" dirty="0" smtClean="0"/>
+              <a:t>для всех исключений или только для отдельных.</a:t>
+            </a:r>
+            <a:endParaRPr lang="en-US" sz="1800" dirty="0"/>
+          </a:p>
+        </p:txBody>
+      </p:sp>
+      <p:pic>
+        <p:nvPicPr>
+          <p:cNvPr id="1028" name="Picture 4"/>
+          <p:cNvPicPr>
+            <a:picLocks noChangeAspect="1" noChangeArrowheads="1"/>
+          </p:cNvPicPr>
+          <p:nvPr/>
+        </p:nvPicPr>
+        <p:blipFill>
+          <a:blip r:embed="rId2">
+            <a:extLst>
+              <a:ext uri="{28A0092B-C50C-407E-A947-70E740481C1C}">
+                <a14:useLocalDpi xmlns:a14="http://schemas.microsoft.com/office/drawing/2010/main" val="0"/>
+              </a:ext>
+            </a:extLst>
+          </a:blip>
+          <a:srcRect/>
+          <a:stretch>
+            <a:fillRect/>
+          </a:stretch>
+        </p:blipFill>
+        <p:spPr bwMode="auto">
+          <a:xfrm>
+            <a:off x="899592" y="3356992"/>
+            <a:ext cx="7002463" cy="3105150"/>
+          </a:xfrm>
+          <a:prstGeom prst="rect">
+            <a:avLst/>
+          </a:prstGeom>
+          <a:noFill/>
+          <a:ln>
+            <a:noFill/>
+          </a:ln>
+          <a:effectLst/>
+          <a:extLst>
+            <a:ext uri="{909E8E84-426E-40DD-AFC4-6F175D3DCCD1}">
+              <a14:hiddenFill xmlns:a14="http://schemas.microsoft.com/office/drawing/2010/main">
+                <a:solidFill>
+                  <a:schemeClr val="accent1"/>
+                </a:solidFill>
+              </a14:hiddenFill>
+            </a:ext>
+            <a:ext uri="{91240B29-F687-4F45-9708-019B960494DF}">
+              <a14:hiddenLine xmlns:a14="http://schemas.microsoft.com/office/drawing/2010/main" w="9525">
+                <a:solidFill>
+                  <a:schemeClr val="tx1"/>
+                </a:solidFill>
+                <a:miter lim="800000"/>
+                <a:headEnd/>
+                <a:tailEnd/>
+              </a14:hiddenLine>
+            </a:ext>
+            <a:ext uri="{AF507438-7753-43E0-B8FC-AC1667EBCBE1}">
+              <a14:hiddenEffects xmlns:a14="http://schemas.microsoft.com/office/drawing/2010/main">
+                <a:effectLst>
+                  <a:outerShdw dist="35921" dir="2700000" algn="ctr" rotWithShape="0">
+                    <a:schemeClr val="bg2"/>
+                  </a:outerShdw>
+                </a:effectLst>
+              </a14:hiddenEffects>
+            </a:ext>
+          </a:extLst>
+        </p:spPr>
+      </p:pic>
+    </p:spTree>
+    <p:extLst>
+      <p:ext uri="{BB962C8B-B14F-4D97-AF65-F5344CB8AC3E}">
+        <p14:creationId xmlns:p14="http://schemas.microsoft.com/office/powerpoint/2010/main" val="274208739"/>
+      </p:ext>
+    </p:extLst>
+  </p:cSld>
+  <p:clrMapOvr>
+    <a:masterClrMapping/>
+  </p:clrMapOvr>
+  <p:timing>
+    <p:tnLst>
+      <p:par>
+        <p:cTn id="1" dur="indefinite" restart="never" nodeType="tmRoot"/>
+      </p:par>
+    </p:tnLst>
+  </p:timing>
+</p:sld>
+</file>
+
+<file path=ppt/slides/slide16.xml><?xml version="1.0" encoding="utf-8"?>
+<p:sld xmlns:a="http://schemas.openxmlformats.org/drawingml/2006/main" xmlns:r="http://schemas.openxmlformats.org/officeDocument/2006/relationships" xmlns:p="http://schemas.openxmlformats.org/presentationml/2006/main">
+  <p:cSld>
+    <p:spTree>
+      <p:nvGrpSpPr>
+        <p:cNvPr id="1" name=""/>
+        <p:cNvGrpSpPr/>
+        <p:nvPr/>
+      </p:nvGrpSpPr>
+      <p:grpSpPr>
+        <a:xfrm>
+          <a:off x="0" y="0"/>
+          <a:ext cx="0" cy="0"/>
+          <a:chOff x="0" y="0"/>
+          <a:chExt cx="0" cy="0"/>
+        </a:xfrm>
+      </p:grpSpPr>
+      <p:sp>
+        <p:nvSpPr>
+          <p:cNvPr id="2" name="Title 1"/>
+          <p:cNvSpPr>
+            <a:spLocks noGrp="1"/>
+          </p:cNvSpPr>
+          <p:nvPr>
+            <p:ph type="title"/>
+          </p:nvPr>
+        </p:nvSpPr>
+        <p:spPr/>
+        <p:txBody>
+          <a:bodyPr>
+            <a:normAutofit/>
+          </a:bodyPr>
+          <a:lstStyle/>
+          <a:p>
+            <a:r>
               <a:rPr lang="en-US" dirty="0" smtClean="0"/>
               <a:t>Windows Error Reporting</a:t>
             </a:r>
@@ -8503,7 +10468,7 @@
 </p:sld>
 </file>
 
-<file path=ppt/slides/slide15.xml><?xml version="1.0" encoding="utf-8"?>
+<file path=ppt/slides/slide17.xml><?xml version="1.0" encoding="utf-8"?>
 <p:sld xmlns:a="http://schemas.openxmlformats.org/drawingml/2006/main" xmlns:r="http://schemas.openxmlformats.org/officeDocument/2006/relationships" xmlns:p="http://schemas.openxmlformats.org/presentationml/2006/main">
   <p:cSld>
     <p:spTree>

</xml_diff>

<commit_message>
Fixed typo in code example
</commit_message>
<xml_diff>
--- a/Presentation/lesson-04-exceptions.pptx
+++ b/Presentation/lesson-04-exceptions.pptx
@@ -307,7 +307,7 @@
             <a:fld id="{FAECF776-F836-4CCD-9497-99E5597B8B5D}" type="datetimeFigureOut">
               <a:rPr lang="en-US" smtClean="0"/>
               <a:pPr/>
-              <a:t>12/3/2015</a:t>
+              <a:t>12/5/2015</a:t>
             </a:fld>
             <a:endParaRPr lang="en-US"/>
           </a:p>
@@ -479,7 +479,7 @@
             <a:fld id="{FAECF776-F836-4CCD-9497-99E5597B8B5D}" type="datetimeFigureOut">
               <a:rPr lang="en-US" smtClean="0"/>
               <a:pPr/>
-              <a:t>12/3/2015</a:t>
+              <a:t>12/5/2015</a:t>
             </a:fld>
             <a:endParaRPr lang="en-US"/>
           </a:p>
@@ -661,7 +661,7 @@
             <a:fld id="{FAECF776-F836-4CCD-9497-99E5597B8B5D}" type="datetimeFigureOut">
               <a:rPr lang="en-US" smtClean="0"/>
               <a:pPr/>
-              <a:t>12/3/2015</a:t>
+              <a:t>12/5/2015</a:t>
             </a:fld>
             <a:endParaRPr lang="en-US"/>
           </a:p>
@@ -833,7 +833,7 @@
             <a:fld id="{FAECF776-F836-4CCD-9497-99E5597B8B5D}" type="datetimeFigureOut">
               <a:rPr lang="en-US" smtClean="0"/>
               <a:pPr/>
-              <a:t>12/3/2015</a:t>
+              <a:t>12/5/2015</a:t>
             </a:fld>
             <a:endParaRPr lang="en-US"/>
           </a:p>
@@ -1081,7 +1081,7 @@
             <a:fld id="{FAECF776-F836-4CCD-9497-99E5597B8B5D}" type="datetimeFigureOut">
               <a:rPr lang="en-US" smtClean="0"/>
               <a:pPr/>
-              <a:t>12/3/2015</a:t>
+              <a:t>12/5/2015</a:t>
             </a:fld>
             <a:endParaRPr lang="en-US"/>
           </a:p>
@@ -1371,7 +1371,7 @@
             <a:fld id="{FAECF776-F836-4CCD-9497-99E5597B8B5D}" type="datetimeFigureOut">
               <a:rPr lang="en-US" smtClean="0"/>
               <a:pPr/>
-              <a:t>12/3/2015</a:t>
+              <a:t>12/5/2015</a:t>
             </a:fld>
             <a:endParaRPr lang="en-US"/>
           </a:p>
@@ -1795,7 +1795,7 @@
             <a:fld id="{FAECF776-F836-4CCD-9497-99E5597B8B5D}" type="datetimeFigureOut">
               <a:rPr lang="en-US" smtClean="0"/>
               <a:pPr/>
-              <a:t>12/3/2015</a:t>
+              <a:t>12/5/2015</a:t>
             </a:fld>
             <a:endParaRPr lang="en-US"/>
           </a:p>
@@ -1915,7 +1915,7 @@
             <a:fld id="{FAECF776-F836-4CCD-9497-99E5597B8B5D}" type="datetimeFigureOut">
               <a:rPr lang="en-US" smtClean="0"/>
               <a:pPr/>
-              <a:t>12/3/2015</a:t>
+              <a:t>12/5/2015</a:t>
             </a:fld>
             <a:endParaRPr lang="en-US"/>
           </a:p>
@@ -2012,7 +2012,7 @@
             <a:fld id="{FAECF776-F836-4CCD-9497-99E5597B8B5D}" type="datetimeFigureOut">
               <a:rPr lang="en-US" smtClean="0"/>
               <a:pPr/>
-              <a:t>12/3/2015</a:t>
+              <a:t>12/5/2015</a:t>
             </a:fld>
             <a:endParaRPr lang="en-US"/>
           </a:p>
@@ -2291,7 +2291,7 @@
             <a:fld id="{FAECF776-F836-4CCD-9497-99E5597B8B5D}" type="datetimeFigureOut">
               <a:rPr lang="en-US" smtClean="0"/>
               <a:pPr/>
-              <a:t>12/3/2015</a:t>
+              <a:t>12/5/2015</a:t>
             </a:fld>
             <a:endParaRPr lang="en-US"/>
           </a:p>
@@ -2546,7 +2546,7 @@
             <a:fld id="{FAECF776-F836-4CCD-9497-99E5597B8B5D}" type="datetimeFigureOut">
               <a:rPr lang="en-US" smtClean="0"/>
               <a:pPr/>
-              <a:t>12/3/2015</a:t>
+              <a:t>12/5/2015</a:t>
             </a:fld>
             <a:endParaRPr lang="en-US"/>
           </a:p>
@@ -2770,7 +2770,7 @@
             <a:fld id="{FAECF776-F836-4CCD-9497-99E5597B8B5D}" type="datetimeFigureOut">
               <a:rPr lang="en-US" smtClean="0"/>
               <a:pPr/>
-              <a:t>12/3/2015</a:t>
+              <a:t>12/5/2015</a:t>
             </a:fld>
             <a:endParaRPr lang="en-US"/>
           </a:p>
@@ -5561,7 +5561,7 @@
                 <a:latin typeface="Courier New" panose="02070309020205020404" pitchFamily="49" charset="0"/>
                 <a:cs typeface="Courier New" panose="02070309020205020404" pitchFamily="49" charset="0"/>
               </a:rPr>
-              <a:t>Idisposable</a:t>
+              <a:t>IDisposable</a:t>
             </a:r>
             <a:r>
               <a:rPr lang="en-US" sz="1000" dirty="0" smtClean="0">

</xml_diff>